<commit_message>
Updated Intro From Bob
Removed the blah, blah, blah
</commit_message>
<xml_diff>
--- a/MAGIC_GitHub_Webinar.pptx
+++ b/MAGIC_GitHub_Webinar.pptx
@@ -5,7 +5,7 @@
     <p:sldMasterId id="2147483660" r:id="rId5"/>
   </p:sldMasterIdLst>
   <p:notesMasterIdLst>
-    <p:notesMasterId r:id="rId25"/>
+    <p:notesMasterId r:id="rId26"/>
   </p:notesMasterIdLst>
   <p:sldIdLst>
     <p:sldId id="291" r:id="rId6"/>
@@ -13,20 +13,21 @@
     <p:sldId id="306" r:id="rId8"/>
     <p:sldId id="307" r:id="rId9"/>
     <p:sldId id="308" r:id="rId10"/>
-    <p:sldId id="292" r:id="rId11"/>
-    <p:sldId id="285" r:id="rId12"/>
-    <p:sldId id="299" r:id="rId13"/>
-    <p:sldId id="296" r:id="rId14"/>
-    <p:sldId id="293" r:id="rId15"/>
-    <p:sldId id="294" r:id="rId16"/>
-    <p:sldId id="295" r:id="rId17"/>
-    <p:sldId id="297" r:id="rId18"/>
-    <p:sldId id="298" r:id="rId19"/>
-    <p:sldId id="300" r:id="rId20"/>
-    <p:sldId id="304" r:id="rId21"/>
-    <p:sldId id="303" r:id="rId22"/>
-    <p:sldId id="302" r:id="rId23"/>
-    <p:sldId id="301" r:id="rId24"/>
+    <p:sldId id="309" r:id="rId11"/>
+    <p:sldId id="292" r:id="rId12"/>
+    <p:sldId id="285" r:id="rId13"/>
+    <p:sldId id="299" r:id="rId14"/>
+    <p:sldId id="296" r:id="rId15"/>
+    <p:sldId id="293" r:id="rId16"/>
+    <p:sldId id="294" r:id="rId17"/>
+    <p:sldId id="295" r:id="rId18"/>
+    <p:sldId id="297" r:id="rId19"/>
+    <p:sldId id="298" r:id="rId20"/>
+    <p:sldId id="300" r:id="rId21"/>
+    <p:sldId id="304" r:id="rId22"/>
+    <p:sldId id="303" r:id="rId23"/>
+    <p:sldId id="302" r:id="rId24"/>
+    <p:sldId id="301" r:id="rId25"/>
   </p:sldIdLst>
   <p:sldSz cx="9144000" cy="6858000" type="screen4x3"/>
   <p:notesSz cx="6858000" cy="9144000"/>
@@ -127,7 +128,7 @@
   </p:defaultTextStyle>
   <p:extLst>
     <p:ext uri="{EFAFB233-063F-42B5-8137-9DF3F51BA10A}">
-      <p15:sldGuideLst xmlns:p15="http://schemas.microsoft.com/office/powerpoint/2012/main" xmlns="">
+      <p15:sldGuideLst xmlns="" xmlns:p15="http://schemas.microsoft.com/office/powerpoint/2012/main">
         <p15:guide id="1" orient="horz" pos="2160">
           <p15:clr>
             <a:srgbClr val="A4A3A4"/>
@@ -227,7 +228,7 @@
             <a:fld id="{82825AA1-EB22-4714-9293-402F26706D20}" type="datetimeFigureOut">
               <a:rPr lang="en-US" smtClean="0"/>
               <a:pPr/>
-              <a:t>7/22/2015</a:t>
+              <a:t>7/23/2015</a:t>
             </a:fld>
             <a:endParaRPr lang="en-US" dirty="0"/>
           </a:p>
@@ -1083,7 +1084,7 @@
     </p:spTree>
     <p:extLst>
       <p:ext uri="{BB962C8B-B14F-4D97-AF65-F5344CB8AC3E}">
-        <p14:creationId xmlns:p14="http://schemas.microsoft.com/office/powerpoint/2010/main" val="970784939"/>
+        <p14:creationId xmlns:p14="http://schemas.microsoft.com/office/powerpoint/2010/main" val="2872639994"/>
       </p:ext>
     </p:extLst>
   </p:cSld>
@@ -1168,7 +1169,7 @@
     </p:spTree>
     <p:extLst>
       <p:ext uri="{BB962C8B-B14F-4D97-AF65-F5344CB8AC3E}">
-        <p14:creationId xmlns:p14="http://schemas.microsoft.com/office/powerpoint/2010/main" val="114524404"/>
+        <p14:creationId xmlns:p14="http://schemas.microsoft.com/office/powerpoint/2010/main" val="970784939"/>
       </p:ext>
     </p:extLst>
   </p:cSld>
@@ -1253,7 +1254,7 @@
     </p:spTree>
     <p:extLst>
       <p:ext uri="{BB962C8B-B14F-4D97-AF65-F5344CB8AC3E}">
-        <p14:creationId xmlns:p14="http://schemas.microsoft.com/office/powerpoint/2010/main" val="3043247559"/>
+        <p14:creationId xmlns:p14="http://schemas.microsoft.com/office/powerpoint/2010/main" val="114524404"/>
       </p:ext>
     </p:extLst>
   </p:cSld>
@@ -1338,7 +1339,7 @@
     </p:spTree>
     <p:extLst>
       <p:ext uri="{BB962C8B-B14F-4D97-AF65-F5344CB8AC3E}">
-        <p14:creationId xmlns:p14="http://schemas.microsoft.com/office/powerpoint/2010/main" val="3960034859"/>
+        <p14:creationId xmlns:p14="http://schemas.microsoft.com/office/powerpoint/2010/main" val="3043247559"/>
       </p:ext>
     </p:extLst>
   </p:cSld>
@@ -1423,7 +1424,7 @@
     </p:spTree>
     <p:extLst>
       <p:ext uri="{BB962C8B-B14F-4D97-AF65-F5344CB8AC3E}">
-        <p14:creationId xmlns:p14="http://schemas.microsoft.com/office/powerpoint/2010/main" val="2265466410"/>
+        <p14:creationId xmlns:p14="http://schemas.microsoft.com/office/powerpoint/2010/main" val="3960034859"/>
       </p:ext>
     </p:extLst>
   </p:cSld>
@@ -1509,6 +1510,91 @@
     <p:extLst>
       <p:ext uri="{BB962C8B-B14F-4D97-AF65-F5344CB8AC3E}">
         <p14:creationId xmlns:p14="http://schemas.microsoft.com/office/powerpoint/2010/main" val="2608875607"/>
+      </p:ext>
+    </p:extLst>
+  </p:cSld>
+  <p:clrMapOvr>
+    <a:masterClrMapping/>
+  </p:clrMapOvr>
+</p:notes>
+</file>
+
+<file path=ppt/notesSlides/notesSlide20.xml><?xml version="1.0" encoding="utf-8"?>
+<p:notes xmlns:a="http://schemas.openxmlformats.org/drawingml/2006/main" xmlns:r="http://schemas.openxmlformats.org/officeDocument/2006/relationships" xmlns:p="http://schemas.openxmlformats.org/presentationml/2006/main">
+  <p:cSld>
+    <p:spTree>
+      <p:nvGrpSpPr>
+        <p:cNvPr id="1" name=""/>
+        <p:cNvGrpSpPr/>
+        <p:nvPr/>
+      </p:nvGrpSpPr>
+      <p:grpSpPr>
+        <a:xfrm>
+          <a:off x="0" y="0"/>
+          <a:ext cx="0" cy="0"/>
+          <a:chOff x="0" y="0"/>
+          <a:chExt cx="0" cy="0"/>
+        </a:xfrm>
+      </p:grpSpPr>
+      <p:sp>
+        <p:nvSpPr>
+          <p:cNvPr id="2" name="Slide Image Placeholder 1"/>
+          <p:cNvSpPr>
+            <a:spLocks noGrp="1" noRot="1" noChangeAspect="1"/>
+          </p:cNvSpPr>
+          <p:nvPr>
+            <p:ph type="sldImg"/>
+          </p:nvPr>
+        </p:nvSpPr>
+        <p:spPr/>
+      </p:sp>
+      <p:sp>
+        <p:nvSpPr>
+          <p:cNvPr id="3" name="Notes Placeholder 2"/>
+          <p:cNvSpPr>
+            <a:spLocks noGrp="1"/>
+          </p:cNvSpPr>
+          <p:nvPr>
+            <p:ph type="body" idx="1"/>
+          </p:nvPr>
+        </p:nvSpPr>
+        <p:spPr/>
+        <p:txBody>
+          <a:bodyPr/>
+          <a:lstStyle/>
+          <a:p>
+            <a:endParaRPr lang="en-US" dirty="0"/>
+          </a:p>
+        </p:txBody>
+      </p:sp>
+      <p:sp>
+        <p:nvSpPr>
+          <p:cNvPr id="4" name="Slide Number Placeholder 3"/>
+          <p:cNvSpPr>
+            <a:spLocks noGrp="1"/>
+          </p:cNvSpPr>
+          <p:nvPr>
+            <p:ph type="sldNum" sz="quarter" idx="10"/>
+          </p:nvPr>
+        </p:nvSpPr>
+        <p:spPr/>
+        <p:txBody>
+          <a:bodyPr/>
+          <a:lstStyle/>
+          <a:p>
+            <a:fld id="{9B26CD33-4337-4529-948A-94F6960B2374}" type="slidenum">
+              <a:rPr lang="en-US" smtClean="0"/>
+              <a:pPr/>
+              <a:t>20</a:t>
+            </a:fld>
+            <a:endParaRPr lang="en-US" dirty="0"/>
+          </a:p>
+        </p:txBody>
+      </p:sp>
+    </p:spTree>
+    <p:extLst>
+      <p:ext uri="{BB962C8B-B14F-4D97-AF65-F5344CB8AC3E}">
+        <p14:creationId xmlns:p14="http://schemas.microsoft.com/office/powerpoint/2010/main" val="2265466410"/>
       </p:ext>
     </p:extLst>
   </p:cSld>
@@ -1763,7 +1849,7 @@
     </p:spTree>
     <p:extLst>
       <p:ext uri="{BB962C8B-B14F-4D97-AF65-F5344CB8AC3E}">
-        <p14:creationId xmlns:p14="http://schemas.microsoft.com/office/powerpoint/2010/main" val="1661061812"/>
+        <p14:creationId xmlns:p14="http://schemas.microsoft.com/office/powerpoint/2010/main" val="3980731364"/>
       </p:ext>
     </p:extLst>
   </p:cSld>
@@ -1848,7 +1934,7 @@
     </p:spTree>
     <p:extLst>
       <p:ext uri="{BB962C8B-B14F-4D97-AF65-F5344CB8AC3E}">
-        <p14:creationId xmlns:p14="http://schemas.microsoft.com/office/powerpoint/2010/main" val="2872639994"/>
+        <p14:creationId xmlns:p14="http://schemas.microsoft.com/office/powerpoint/2010/main" val="1661061812"/>
       </p:ext>
     </p:extLst>
   </p:cSld>
@@ -5353,7 +5439,7 @@
         <p:spPr>
           <a:xfrm>
             <a:off x="990600" y="1143000"/>
-            <a:ext cx="7162800" cy="1754326"/>
+            <a:ext cx="7162800" cy="1477328"/>
           </a:xfrm>
           <a:prstGeom prst="rect">
             <a:avLst/>
@@ -5367,8 +5453,12 @@
           <a:lstStyle/>
           <a:p>
             <a:r>
+              <a:rPr lang="en-US" b="1" dirty="0" err="1" smtClean="0"/>
+              <a:t>Git</a:t>
+            </a:r>
+            <a:r>
               <a:rPr lang="en-US" b="1" dirty="0" smtClean="0"/>
-              <a:t>Repository (n)</a:t>
+              <a:t> (n)</a:t>
             </a:r>
             <a:r>
               <a:rPr lang="en-US" dirty="0" smtClean="0"/>
@@ -5381,42 +5471,23 @@
           <a:p>
             <a:r>
               <a:rPr lang="en-US" dirty="0" smtClean="0"/>
-              <a:t>place where the history of work is stored</a:t>
-            </a:r>
-          </a:p>
-          <a:p>
-            <a:endParaRPr lang="en-US" dirty="0"/>
-          </a:p>
-          <a:p>
-            <a:pPr marL="285750" indent="-285750">
-              <a:buFont typeface="Arial" panose="020B0604020202020204" pitchFamily="34" charset="0"/>
-              <a:buChar char="•"/>
-            </a:pPr>
+              <a:t>distributed revision control system (version control software, VCS) run from command-line tools. GitHub expanded on </a:t>
+            </a:r>
+            <a:r>
+              <a:rPr lang="en-US" dirty="0" err="1" smtClean="0"/>
+              <a:t>Git</a:t>
+            </a:r>
             <a:r>
               <a:rPr lang="en-US" dirty="0" smtClean="0"/>
-              <a:t>Let’s see it: </a:t>
-            </a:r>
-            <a:r>
-              <a:rPr lang="en-US" dirty="0" smtClean="0">
-                <a:hlinkClick r:id="rId3"/>
-              </a:rPr>
-              <a:t>here</a:t>
-            </a:r>
-            <a:endParaRPr lang="en-US" dirty="0" smtClean="0"/>
-          </a:p>
-          <a:p>
-            <a:pPr marL="285750" indent="-285750">
-              <a:buFont typeface="Arial" panose="020B0604020202020204" pitchFamily="34" charset="0"/>
-              <a:buChar char="•"/>
-            </a:pPr>
-            <a:endParaRPr lang="en-US" dirty="0"/>
+              <a:t> and added graphic user interface tools</a:t>
+            </a:r>
           </a:p>
         </p:txBody>
       </p:sp>
     </p:spTree>
     <p:extLst>
       <p:ext uri="{BB962C8B-B14F-4D97-AF65-F5344CB8AC3E}">
-        <p14:creationId xmlns:p14="http://schemas.microsoft.com/office/powerpoint/2010/main" val="2782269401"/>
+        <p14:creationId xmlns:p14="http://schemas.microsoft.com/office/powerpoint/2010/main" val="2336358536"/>
       </p:ext>
     </p:extLst>
   </p:cSld>
@@ -5536,7 +5607,7 @@
         <p:spPr>
           <a:xfrm>
             <a:off x="990600" y="1143000"/>
-            <a:ext cx="7162800" cy="2031325"/>
+            <a:ext cx="7162800" cy="1754326"/>
           </a:xfrm>
           <a:prstGeom prst="rect">
             <a:avLst/>
@@ -5551,7 +5622,7 @@
           <a:p>
             <a:r>
               <a:rPr lang="en-US" b="1" dirty="0" smtClean="0"/>
-              <a:t>Fork (v)</a:t>
+              <a:t>Repository (n)</a:t>
             </a:r>
             <a:r>
               <a:rPr lang="en-US" dirty="0" smtClean="0"/>
@@ -5563,12 +5634,8 @@
           </a:p>
           <a:p>
             <a:r>
-              <a:rPr lang="en-US" dirty="0"/>
-              <a:t>c</a:t>
-            </a:r>
-            <a:r>
               <a:rPr lang="en-US" dirty="0" smtClean="0"/>
-              <a:t>lone a repository, usually intending to make your own edits and commit changes</a:t>
+              <a:t>place where the history of work is stored</a:t>
             </a:r>
           </a:p>
           <a:p>
@@ -5603,7 +5670,7 @@
     </p:spTree>
     <p:extLst>
       <p:ext uri="{BB962C8B-B14F-4D97-AF65-F5344CB8AC3E}">
-        <p14:creationId xmlns:p14="http://schemas.microsoft.com/office/powerpoint/2010/main" val="14464946"/>
+        <p14:creationId xmlns:p14="http://schemas.microsoft.com/office/powerpoint/2010/main" val="2782269401"/>
       </p:ext>
     </p:extLst>
   </p:cSld>
@@ -5738,7 +5805,7 @@
           <a:p>
             <a:r>
               <a:rPr lang="en-US" b="1" dirty="0" smtClean="0"/>
-              <a:t>Branch (n)</a:t>
+              <a:t>Fork (v)</a:t>
             </a:r>
             <a:r>
               <a:rPr lang="en-US" dirty="0" smtClean="0"/>
@@ -5750,8 +5817,12 @@
           </a:p>
           <a:p>
             <a:r>
+              <a:rPr lang="en-US" dirty="0"/>
+              <a:t>c</a:t>
+            </a:r>
+            <a:r>
               <a:rPr lang="en-US" dirty="0" smtClean="0"/>
-              <a:t>new repository created from forking a project, can become it’s own project or eventually reconciled to the parent repository</a:t>
+              <a:t>lone a repository, usually intending to make your own edits and commit changes</a:t>
             </a:r>
           </a:p>
           <a:p>
@@ -5786,7 +5857,7 @@
     </p:spTree>
     <p:extLst>
       <p:ext uri="{BB962C8B-B14F-4D97-AF65-F5344CB8AC3E}">
-        <p14:creationId xmlns:p14="http://schemas.microsoft.com/office/powerpoint/2010/main" val="3726889477"/>
+        <p14:creationId xmlns:p14="http://schemas.microsoft.com/office/powerpoint/2010/main" val="14464946"/>
       </p:ext>
     </p:extLst>
   </p:cSld>
@@ -5906,7 +5977,7 @@
         <p:spPr>
           <a:xfrm>
             <a:off x="990600" y="1143000"/>
-            <a:ext cx="7162800" cy="4247317"/>
+            <a:ext cx="7162800" cy="2031325"/>
           </a:xfrm>
           <a:prstGeom prst="rect">
             <a:avLst/>
@@ -5921,7 +5992,7 @@
           <a:p>
             <a:r>
               <a:rPr lang="en-US" b="1" dirty="0" smtClean="0"/>
-              <a:t>Merge (v)</a:t>
+              <a:t>Branch (n)</a:t>
             </a:r>
             <a:r>
               <a:rPr lang="en-US" dirty="0" smtClean="0"/>
@@ -5934,66 +6005,34 @@
           <a:p>
             <a:r>
               <a:rPr lang="en-US" dirty="0" smtClean="0"/>
-              <a:t>integrating the changes from a branch into another</a:t>
+              <a:t>new repository created from forking a project, can become it’s own project or eventually reconciled to the parent repository</a:t>
             </a:r>
           </a:p>
           <a:p>
             <a:endParaRPr lang="en-US" dirty="0"/>
           </a:p>
           <a:p>
-            <a:r>
-              <a:rPr lang="en-US" b="1" dirty="0" smtClean="0"/>
-              <a:t>Commit (n):</a:t>
-            </a:r>
-          </a:p>
-          <a:p>
-            <a:endParaRPr lang="en-US" dirty="0"/>
-          </a:p>
-          <a:p>
-            <a:r>
-              <a:rPr lang="en-US" dirty="0"/>
-              <a:t>a</a:t>
-            </a:r>
+            <a:pPr marL="285750" indent="-285750">
+              <a:buFont typeface="Arial" panose="020B0604020202020204" pitchFamily="34" charset="0"/>
+              <a:buChar char="•"/>
+            </a:pPr>
             <a:r>
               <a:rPr lang="en-US" dirty="0" smtClean="0"/>
-              <a:t>n individual change to a file or set of files, somewhat like a file “save”</a:t>
-            </a:r>
-          </a:p>
-          <a:p>
-            <a:endParaRPr lang="en-US" dirty="0"/>
-          </a:p>
-          <a:p>
-            <a:r>
-              <a:rPr lang="en-US" b="1" dirty="0" smtClean="0"/>
-              <a:t>Pull (v):</a:t>
-            </a:r>
-          </a:p>
-          <a:p>
-            <a:endParaRPr lang="en-US" dirty="0"/>
-          </a:p>
-          <a:p>
-            <a:r>
-              <a:rPr lang="en-US" dirty="0" smtClean="0"/>
-              <a:t>integrating other’s changes into your local copy of files</a:t>
-            </a:r>
-          </a:p>
-          <a:p>
-            <a:endParaRPr lang="en-US" dirty="0"/>
-          </a:p>
-          <a:p>
-            <a:r>
-              <a:rPr lang="en-US" b="1" dirty="0" smtClean="0"/>
-              <a:t>Push (v):</a:t>
-            </a:r>
-          </a:p>
-          <a:p>
-            <a:endParaRPr lang="en-US" dirty="0"/>
-          </a:p>
-          <a:p>
-            <a:r>
-              <a:rPr lang="en-US" dirty="0" smtClean="0"/>
-              <a:t>sending your committed changes to a remote repository</a:t>
-            </a:r>
+              <a:t>Let’s see it: </a:t>
+            </a:r>
+            <a:r>
+              <a:rPr lang="en-US" dirty="0" smtClean="0">
+                <a:hlinkClick r:id="rId3"/>
+              </a:rPr>
+              <a:t>here</a:t>
+            </a:r>
+            <a:endParaRPr lang="en-US" dirty="0" smtClean="0"/>
+          </a:p>
+          <a:p>
+            <a:pPr marL="285750" indent="-285750">
+              <a:buFont typeface="Arial" panose="020B0604020202020204" pitchFamily="34" charset="0"/>
+              <a:buChar char="•"/>
+            </a:pPr>
             <a:endParaRPr lang="en-US" dirty="0"/>
           </a:p>
         </p:txBody>
@@ -6001,7 +6040,7 @@
     </p:spTree>
     <p:extLst>
       <p:ext uri="{BB962C8B-B14F-4D97-AF65-F5344CB8AC3E}">
-        <p14:creationId xmlns:p14="http://schemas.microsoft.com/office/powerpoint/2010/main" val="2484392800"/>
+        <p14:creationId xmlns:p14="http://schemas.microsoft.com/office/powerpoint/2010/main" val="3726889477"/>
       </p:ext>
     </p:extLst>
   </p:cSld>
@@ -6071,7 +6110,7 @@
           <a:p>
             <a:r>
               <a:rPr lang="en-US" sz="2800" dirty="0" smtClean="0"/>
-              <a:t>GitHub: Where It Operates</a:t>
+              <a:t>GitHub: Key Definitions</a:t>
             </a:r>
             <a:endParaRPr lang="en-US" sz="2800" dirty="0"/>
           </a:p>
@@ -6121,7 +6160,7 @@
         <p:spPr>
           <a:xfrm>
             <a:off x="990600" y="1143000"/>
-            <a:ext cx="7162800" cy="1477328"/>
+            <a:ext cx="7162800" cy="4247317"/>
           </a:xfrm>
           <a:prstGeom prst="rect">
             <a:avLst/>
@@ -6135,26 +6174,79 @@
           <a:lstStyle/>
           <a:p>
             <a:r>
+              <a:rPr lang="en-US" b="1" dirty="0" smtClean="0"/>
+              <a:t>Merge (v)</a:t>
+            </a:r>
+            <a:r>
               <a:rPr lang="en-US" dirty="0" smtClean="0"/>
-              <a:t>Online: www.github.com</a:t>
-            </a:r>
-          </a:p>
-          <a:p>
-            <a:endParaRPr lang="en-US" dirty="0" smtClean="0"/>
+              <a:t>: </a:t>
+            </a:r>
+          </a:p>
+          <a:p>
+            <a:endParaRPr lang="en-US" dirty="0"/>
           </a:p>
           <a:p>
             <a:r>
               <a:rPr lang="en-US" dirty="0" smtClean="0"/>
-              <a:t>Desktop Client</a:t>
-            </a:r>
-          </a:p>
-          <a:p>
-            <a:endParaRPr lang="en-US" dirty="0" smtClean="0"/>
-          </a:p>
-          <a:p>
+              <a:t>integrating the changes from a branch into another</a:t>
+            </a:r>
+          </a:p>
+          <a:p>
+            <a:endParaRPr lang="en-US" dirty="0"/>
+          </a:p>
+          <a:p>
+            <a:r>
+              <a:rPr lang="en-US" b="1" dirty="0" smtClean="0"/>
+              <a:t>Commit (n):</a:t>
+            </a:r>
+          </a:p>
+          <a:p>
+            <a:endParaRPr lang="en-US" dirty="0"/>
+          </a:p>
+          <a:p>
+            <a:r>
+              <a:rPr lang="en-US" dirty="0"/>
+              <a:t>a</a:t>
+            </a:r>
             <a:r>
               <a:rPr lang="en-US" dirty="0" smtClean="0"/>
-              <a:t>Plugins (I haven’t tried them yet)</a:t>
+              <a:t>n individual change to a file or set of files, somewhat like a file “save”</a:t>
+            </a:r>
+          </a:p>
+          <a:p>
+            <a:endParaRPr lang="en-US" dirty="0"/>
+          </a:p>
+          <a:p>
+            <a:r>
+              <a:rPr lang="en-US" b="1" dirty="0" smtClean="0"/>
+              <a:t>Pull (v):</a:t>
+            </a:r>
+          </a:p>
+          <a:p>
+            <a:endParaRPr lang="en-US" dirty="0"/>
+          </a:p>
+          <a:p>
+            <a:r>
+              <a:rPr lang="en-US" dirty="0" smtClean="0"/>
+              <a:t>integrating other’s changes into your local copy of files</a:t>
+            </a:r>
+          </a:p>
+          <a:p>
+            <a:endParaRPr lang="en-US" dirty="0"/>
+          </a:p>
+          <a:p>
+            <a:r>
+              <a:rPr lang="en-US" b="1" dirty="0" smtClean="0"/>
+              <a:t>Push (v):</a:t>
+            </a:r>
+          </a:p>
+          <a:p>
+            <a:endParaRPr lang="en-US" dirty="0"/>
+          </a:p>
+          <a:p>
+            <a:r>
+              <a:rPr lang="en-US" dirty="0" smtClean="0"/>
+              <a:t>sending your committed changes to a remote repository</a:t>
             </a:r>
             <a:endParaRPr lang="en-US" dirty="0"/>
           </a:p>
@@ -6163,7 +6255,7 @@
     </p:spTree>
     <p:extLst>
       <p:ext uri="{BB962C8B-B14F-4D97-AF65-F5344CB8AC3E}">
-        <p14:creationId xmlns:p14="http://schemas.microsoft.com/office/powerpoint/2010/main" val="3153891827"/>
+        <p14:creationId xmlns:p14="http://schemas.microsoft.com/office/powerpoint/2010/main" val="2484392800"/>
       </p:ext>
     </p:extLst>
   </p:cSld>
@@ -6217,7 +6309,7 @@
         </p:nvSpPr>
         <p:spPr>
           <a:xfrm>
-            <a:off x="888763" y="457200"/>
+            <a:off x="914400" y="457200"/>
             <a:ext cx="7239000" cy="523220"/>
           </a:xfrm>
           <a:prstGeom prst="rect">
@@ -6233,7 +6325,7 @@
           <a:p>
             <a:r>
               <a:rPr lang="en-US" sz="2800" dirty="0" smtClean="0"/>
-              <a:t>GitHub: Demonstration- Getting Started</a:t>
+              <a:t>GitHub: Where It Operates</a:t>
             </a:r>
             <a:endParaRPr lang="en-US" sz="2800" dirty="0"/>
           </a:p>
@@ -6296,50 +6388,36 @@
           </a:bodyPr>
           <a:lstStyle/>
           <a:p>
+            <a:r>
+              <a:rPr lang="en-US" dirty="0" smtClean="0"/>
+              <a:t>Online: www.github.com</a:t>
+            </a:r>
+          </a:p>
+          <a:p>
             <a:endParaRPr lang="en-US" dirty="0" smtClean="0"/>
           </a:p>
           <a:p>
-            <a:pPr marL="342900" indent="-342900">
-              <a:buAutoNum type="arabicParenR"/>
-            </a:pPr>
             <a:r>
               <a:rPr lang="en-US" dirty="0" smtClean="0"/>
-              <a:t>Sign up for an account</a:t>
-            </a:r>
-          </a:p>
-          <a:p>
-            <a:pPr marL="342900" indent="-342900">
-              <a:buAutoNum type="arabicParenR"/>
-            </a:pPr>
+              <a:t>Desktop Client</a:t>
+            </a:r>
+          </a:p>
+          <a:p>
+            <a:endParaRPr lang="en-US" dirty="0" smtClean="0"/>
+          </a:p>
+          <a:p>
             <a:r>
               <a:rPr lang="en-US" dirty="0" smtClean="0"/>
-              <a:t>Download and Install GitHub for Windows/Mac</a:t>
-            </a:r>
-          </a:p>
-          <a:p>
-            <a:pPr marL="342900" indent="-342900">
-              <a:buAutoNum type="arabicParenR"/>
-            </a:pPr>
-            <a:r>
-              <a:rPr lang="en-US" dirty="0" smtClean="0"/>
-              <a:t>Create GitHub Repository</a:t>
-            </a:r>
-          </a:p>
-          <a:p>
-            <a:pPr marL="342900" indent="-342900">
-              <a:buAutoNum type="arabicParenR"/>
-            </a:pPr>
-            <a:r>
-              <a:rPr lang="en-US" dirty="0" smtClean="0"/>
-              <a:t>Clone Local Repository</a:t>
-            </a:r>
+              <a:t>Plugins (I haven’t tried them yet)</a:t>
+            </a:r>
+            <a:endParaRPr lang="en-US" dirty="0"/>
           </a:p>
         </p:txBody>
       </p:sp>
     </p:spTree>
     <p:extLst>
       <p:ext uri="{BB962C8B-B14F-4D97-AF65-F5344CB8AC3E}">
-        <p14:creationId xmlns:p14="http://schemas.microsoft.com/office/powerpoint/2010/main" val="563491419"/>
+        <p14:creationId xmlns:p14="http://schemas.microsoft.com/office/powerpoint/2010/main" val="3153891827"/>
       </p:ext>
     </p:extLst>
   </p:cSld>
@@ -6409,7 +6487,7 @@
           <a:p>
             <a:r>
               <a:rPr lang="en-US" sz="2800" dirty="0" smtClean="0"/>
-              <a:t>GitHub: Demonstration- Your Code/Data</a:t>
+              <a:t>GitHub: Demonstration- Getting Started</a:t>
             </a:r>
             <a:endParaRPr lang="en-US" sz="2800" dirty="0"/>
           </a:p>
@@ -6459,7 +6537,7 @@
         <p:spPr>
           <a:xfrm>
             <a:off x="990600" y="1143000"/>
-            <a:ext cx="7162800" cy="2585323"/>
+            <a:ext cx="7162800" cy="1477328"/>
           </a:xfrm>
           <a:prstGeom prst="rect">
             <a:avLst/>
@@ -6480,136 +6558,42 @@
             </a:pPr>
             <a:r>
               <a:rPr lang="en-US" dirty="0" smtClean="0"/>
-              <a:t>Add your own Code/Documents</a:t>
-            </a:r>
-          </a:p>
-          <a:p>
-            <a:pPr marL="800100" lvl="1" indent="-342900">
-              <a:buFont typeface="Wingdings" panose="05000000000000000000" pitchFamily="2" charset="2"/>
-              <a:buChar char="q"/>
+              <a:t>Sign up for an account</a:t>
+            </a:r>
+          </a:p>
+          <a:p>
+            <a:pPr marL="342900" indent="-342900">
+              <a:buAutoNum type="arabicParenR"/>
             </a:pPr>
             <a:r>
               <a:rPr lang="en-US" dirty="0" smtClean="0"/>
-              <a:t>Add documents to local repo</a:t>
-            </a:r>
-          </a:p>
-          <a:p>
-            <a:pPr marL="1200150" lvl="2" indent="-285750">
-              <a:buFont typeface="Arial" panose="020B0604020202020204" pitchFamily="34" charset="0"/>
-              <a:buChar char="•"/>
+              <a:t>Download and Install GitHub for Windows/Mac</a:t>
+            </a:r>
+          </a:p>
+          <a:p>
+            <a:pPr marL="342900" indent="-342900">
+              <a:buAutoNum type="arabicParenR"/>
             </a:pPr>
             <a:r>
-              <a:rPr lang="en-US" sz="1600" b="1" dirty="0" smtClean="0"/>
-              <a:t> </a:t>
-            </a:r>
-            <a:r>
-              <a:rPr lang="en-US" sz="1600" b="1" dirty="0" err="1" smtClean="0"/>
-              <a:t>ie</a:t>
-            </a:r>
-            <a:r>
-              <a:rPr lang="en-US" sz="1600" b="1" dirty="0" smtClean="0"/>
-              <a:t>: </a:t>
-            </a:r>
-            <a:r>
-              <a:rPr lang="en-US" sz="1600" b="1" dirty="0" smtClean="0">
-                <a:solidFill>
-                  <a:srgbClr val="FF0000"/>
-                </a:solidFill>
-              </a:rPr>
-              <a:t>C</a:t>
-            </a:r>
-            <a:r>
-              <a:rPr lang="en-US" sz="1600" b="1" dirty="0">
-                <a:solidFill>
-                  <a:srgbClr val="FF0000"/>
-                </a:solidFill>
-              </a:rPr>
-              <a:t>:</a:t>
-            </a:r>
-            <a:r>
-              <a:rPr lang="en-US" sz="1600" b="1" dirty="0"/>
-              <a:t>\</a:t>
-            </a:r>
-            <a:r>
-              <a:rPr lang="en-US" sz="1600" b="1" dirty="0" smtClean="0"/>
-              <a:t>Users\addavis\Documents\GitHub\[REPO NAME]</a:t>
-            </a:r>
-            <a:endParaRPr lang="en-US" sz="1600" dirty="0" smtClean="0"/>
-          </a:p>
-          <a:p>
-            <a:pPr marL="800100" lvl="1" indent="-342900">
-              <a:buFont typeface="Wingdings" panose="05000000000000000000" pitchFamily="2" charset="2"/>
-              <a:buChar char="q"/>
+              <a:rPr lang="en-US" dirty="0" smtClean="0"/>
+              <a:t>Create GitHub Repository</a:t>
+            </a:r>
+          </a:p>
+          <a:p>
+            <a:pPr marL="342900" indent="-342900">
+              <a:buAutoNum type="arabicParenR"/>
             </a:pPr>
             <a:r>
               <a:rPr lang="en-US" dirty="0" smtClean="0"/>
-              <a:t>Edit documents on local repo</a:t>
-            </a:r>
-          </a:p>
-          <a:p>
-            <a:pPr marL="800100" lvl="1" indent="-342900">
-              <a:buFont typeface="Wingdings" panose="05000000000000000000" pitchFamily="2" charset="2"/>
-              <a:buChar char="q"/>
-            </a:pPr>
-            <a:r>
-              <a:rPr lang="en-US" dirty="0" smtClean="0"/>
-              <a:t>Commit changes to local repo</a:t>
-            </a:r>
-          </a:p>
-          <a:p>
-            <a:pPr marL="800100" lvl="1" indent="-342900">
-              <a:buFont typeface="Wingdings" panose="05000000000000000000" pitchFamily="2" charset="2"/>
-              <a:buChar char="q"/>
-            </a:pPr>
-            <a:r>
-              <a:rPr lang="en-US" dirty="0" smtClean="0"/>
-              <a:t>Sync changes to GitHub repo</a:t>
-            </a:r>
-          </a:p>
-          <a:p>
-            <a:pPr marL="1257300" lvl="2" indent="-342900">
-              <a:buFont typeface="Arial" panose="020B0604020202020204" pitchFamily="34" charset="0"/>
-              <a:buChar char="•"/>
-            </a:pPr>
-            <a:r>
-              <a:rPr lang="en-US" sz="1600" b="1" dirty="0" err="1"/>
-              <a:t>ie</a:t>
-            </a:r>
-            <a:r>
-              <a:rPr lang="en-US" sz="1600" b="1" dirty="0"/>
-              <a:t>: https://</a:t>
-            </a:r>
-            <a:r>
-              <a:rPr lang="en-US" sz="1600" b="1" dirty="0" smtClean="0"/>
-              <a:t>github.com/</a:t>
-            </a:r>
-            <a:r>
-              <a:rPr lang="en-US" sz="1600" b="1" dirty="0" smtClean="0">
-                <a:solidFill>
-                  <a:srgbClr val="FF0000"/>
-                </a:solidFill>
-              </a:rPr>
-              <a:t>davisgis</a:t>
-            </a:r>
-            <a:r>
-              <a:rPr lang="en-US" sz="1600" b="1" dirty="0" smtClean="0"/>
-              <a:t>/[REPO NAME]</a:t>
-            </a:r>
-            <a:endParaRPr lang="en-US" sz="1600" b="1" dirty="0"/>
-          </a:p>
-          <a:p>
-            <a:pPr marL="1257300" lvl="2" indent="-342900">
-              <a:buFont typeface="Arial" panose="020B0604020202020204" pitchFamily="34" charset="0"/>
-              <a:buChar char="•"/>
-            </a:pPr>
-            <a:endParaRPr lang="en-US" dirty="0"/>
+              <a:t>Clone Local Repository</a:t>
+            </a:r>
           </a:p>
         </p:txBody>
       </p:sp>
     </p:spTree>
     <p:extLst>
       <p:ext uri="{BB962C8B-B14F-4D97-AF65-F5344CB8AC3E}">
-        <p14:creationId xmlns:p14="http://schemas.microsoft.com/office/powerpoint/2010/main" val="1311636492"/>
+        <p14:creationId xmlns:p14="http://schemas.microsoft.com/office/powerpoint/2010/main" val="563491419"/>
       </p:ext>
     </p:extLst>
   </p:cSld>
@@ -6679,7 +6663,7 @@
           <a:p>
             <a:r>
               <a:rPr lang="en-US" sz="2800" dirty="0" smtClean="0"/>
-              <a:t>GitHub: Demonstration- Another’s Code/Data</a:t>
+              <a:t>GitHub: Demonstration- Your Code/Data</a:t>
             </a:r>
             <a:endParaRPr lang="en-US" sz="2800" dirty="0"/>
           </a:p>
@@ -6729,7 +6713,7 @@
         <p:spPr>
           <a:xfrm>
             <a:off x="990600" y="1143000"/>
-            <a:ext cx="7162800" cy="2769989"/>
+            <a:ext cx="7162800" cy="2585323"/>
           </a:xfrm>
           <a:prstGeom prst="rect">
             <a:avLst/>
@@ -6742,32 +6726,16 @@
           </a:bodyPr>
           <a:lstStyle/>
           <a:p>
+            <a:endParaRPr lang="en-US" dirty="0" smtClean="0"/>
+          </a:p>
+          <a:p>
             <a:pPr marL="342900" indent="-342900">
               <a:buAutoNum type="arabicParenR"/>
             </a:pPr>
             <a:r>
               <a:rPr lang="en-US" dirty="0" smtClean="0"/>
-              <a:t>Fork </a:t>
-            </a:r>
-            <a:r>
-              <a:rPr lang="en-US" dirty="0"/>
-              <a:t>another </a:t>
-            </a:r>
-            <a:r>
-              <a:rPr lang="en-US" dirty="0" smtClean="0"/>
-              <a:t>repository</a:t>
-            </a:r>
-          </a:p>
-          <a:p>
-            <a:pPr marL="800100" lvl="1" indent="-342900">
-              <a:buFont typeface="Wingdings" panose="05000000000000000000" pitchFamily="2" charset="2"/>
-              <a:buChar char="Ø"/>
-            </a:pPr>
-            <a:r>
-              <a:rPr lang="en-US" dirty="0" smtClean="0"/>
-              <a:t>Fork a repo in which you would like to collaborate</a:t>
-            </a:r>
-            <a:endParaRPr lang="en-US" dirty="0"/>
+              <a:t>Add your own Code/Documents</a:t>
+            </a:r>
           </a:p>
           <a:p>
             <a:pPr marL="800100" lvl="1" indent="-342900">
@@ -6775,26 +6743,34 @@
               <a:buChar char="q"/>
             </a:pPr>
             <a:r>
-              <a:rPr lang="en-US" u="sng" dirty="0"/>
-              <a:t>Edit</a:t>
-            </a:r>
-            <a:r>
-              <a:rPr lang="en-US" dirty="0"/>
-              <a:t> your forked local repository </a:t>
-            </a:r>
-          </a:p>
-          <a:p>
-            <a:pPr marL="1257300" lvl="2" indent="-342900">
+              <a:rPr lang="en-US" dirty="0" smtClean="0"/>
+              <a:t>Add documents to local repo</a:t>
+            </a:r>
+          </a:p>
+          <a:p>
+            <a:pPr marL="1200150" lvl="2" indent="-285750">
               <a:buFont typeface="Arial" panose="020B0604020202020204" pitchFamily="34" charset="0"/>
               <a:buChar char="•"/>
             </a:pPr>
             <a:r>
-              <a:rPr lang="en-US" sz="1600" b="1" dirty="0" err="1"/>
+              <a:rPr lang="en-US" sz="1600" b="1" dirty="0" smtClean="0"/>
+              <a:t> </a:t>
+            </a:r>
+            <a:r>
+              <a:rPr lang="en-US" sz="1600" b="1" dirty="0" err="1" smtClean="0"/>
               <a:t>ie</a:t>
             </a:r>
             <a:r>
-              <a:rPr lang="en-US" sz="1600" b="1" dirty="0"/>
+              <a:rPr lang="en-US" sz="1600" b="1" dirty="0" smtClean="0"/>
               <a:t>: </a:t>
+            </a:r>
+            <a:r>
+              <a:rPr lang="en-US" sz="1600" b="1" dirty="0" smtClean="0">
+                <a:solidFill>
+                  <a:srgbClr val="FF0000"/>
+                </a:solidFill>
+              </a:rPr>
+              <a:t>C</a:t>
             </a:r>
             <a:r>
               <a:rPr lang="en-US" sz="1600" b="1" dirty="0">
@@ -6802,13 +6778,17 @@
                   <a:srgbClr val="FF0000"/>
                 </a:solidFill>
               </a:rPr>
-              <a:t>C:</a:t>
+              <a:t>:</a:t>
             </a:r>
             <a:r>
               <a:rPr lang="en-US" sz="1600" b="1" dirty="0"/>
-              <a:t>\Users\addavis\Documents\GitHub\GithubWebinar_2015</a:t>
-            </a:r>
-            <a:endParaRPr lang="en-US" b="1" dirty="0"/>
+              <a:t>\</a:t>
+            </a:r>
+            <a:r>
+              <a:rPr lang="en-US" sz="1600" b="1" dirty="0" smtClean="0"/>
+              <a:t>Users\addavis\Documents\GitHub\[REPO NAME]</a:t>
+            </a:r>
+            <a:endParaRPr lang="en-US" sz="1600" dirty="0" smtClean="0"/>
           </a:p>
           <a:p>
             <a:pPr marL="800100" lvl="1" indent="-342900">
@@ -6816,12 +6796,28 @@
               <a:buChar char="q"/>
             </a:pPr>
             <a:r>
-              <a:rPr lang="en-US" u="sng" dirty="0"/>
-              <a:t>Commit</a:t>
-            </a:r>
-            <a:r>
-              <a:rPr lang="en-US" dirty="0"/>
-              <a:t> changes to your local repository </a:t>
+              <a:rPr lang="en-US" dirty="0" smtClean="0"/>
+              <a:t>Edit documents on local repo</a:t>
+            </a:r>
+          </a:p>
+          <a:p>
+            <a:pPr marL="800100" lvl="1" indent="-342900">
+              <a:buFont typeface="Wingdings" panose="05000000000000000000" pitchFamily="2" charset="2"/>
+              <a:buChar char="q"/>
+            </a:pPr>
+            <a:r>
+              <a:rPr lang="en-US" dirty="0" smtClean="0"/>
+              <a:t>Commit changes to local repo</a:t>
+            </a:r>
+          </a:p>
+          <a:p>
+            <a:pPr marL="800100" lvl="1" indent="-342900">
+              <a:buFont typeface="Wingdings" panose="05000000000000000000" pitchFamily="2" charset="2"/>
+              <a:buChar char="q"/>
+            </a:pPr>
+            <a:r>
+              <a:rPr lang="en-US" dirty="0" smtClean="0"/>
+              <a:t>Sync changes to GitHub repo</a:t>
             </a:r>
           </a:p>
           <a:p>
@@ -6830,39 +6826,19 @@
               <a:buChar char="•"/>
             </a:pPr>
             <a:r>
-              <a:rPr lang="en-US" dirty="0"/>
-              <a:t>As Kristen mentioned, a lot like a “save file”</a:t>
-            </a:r>
-          </a:p>
-          <a:p>
-            <a:pPr marL="800100" lvl="1" indent="-342900">
-              <a:buFont typeface="Wingdings" panose="05000000000000000000" pitchFamily="2" charset="2"/>
-              <a:buChar char="q"/>
-            </a:pPr>
-            <a:r>
-              <a:rPr lang="en-US" u="sng" dirty="0"/>
-              <a:t>Sync</a:t>
-            </a:r>
-            <a:r>
-              <a:rPr lang="en-US" dirty="0"/>
-              <a:t> changes to your GitHub repository</a:t>
-            </a:r>
-          </a:p>
-          <a:p>
-            <a:pPr marL="1257300" lvl="2" indent="-342900">
-              <a:buFont typeface="Arial" panose="020B0604020202020204" pitchFamily="34" charset="0"/>
-              <a:buChar char="•"/>
-            </a:pPr>
-            <a:r>
               <a:rPr lang="en-US" sz="1600" b="1" dirty="0" err="1"/>
               <a:t>ie</a:t>
             </a:r>
             <a:r>
               <a:rPr lang="en-US" sz="1600" b="1" dirty="0"/>
-              <a:t>: https://github.com/</a:t>
-            </a:r>
-            <a:r>
-              <a:rPr lang="en-US" sz="1600" b="1" dirty="0">
+              <a:t>: https://</a:t>
+            </a:r>
+            <a:r>
+              <a:rPr lang="en-US" sz="1600" b="1" dirty="0" smtClean="0"/>
+              <a:t>github.com/</a:t>
+            </a:r>
+            <a:r>
+              <a:rPr lang="en-US" sz="1600" b="1" dirty="0" smtClean="0">
                 <a:solidFill>
                   <a:srgbClr val="FF0000"/>
                 </a:solidFill>
@@ -6870,71 +6846,24 @@
               <a:t>davisgis</a:t>
             </a:r>
             <a:r>
-              <a:rPr lang="en-US" sz="1600" b="1" dirty="0"/>
-              <a:t>/GithubWebinar_2015</a:t>
-            </a:r>
-            <a:endParaRPr lang="en-US" b="1" dirty="0"/>
-          </a:p>
-          <a:p>
-            <a:pPr marL="800100" lvl="1" indent="-342900">
-              <a:buFont typeface="Wingdings" panose="05000000000000000000" pitchFamily="2" charset="2"/>
-              <a:buChar char="q"/>
-            </a:pPr>
-            <a:r>
-              <a:rPr lang="en-US" dirty="0"/>
-              <a:t>Create </a:t>
-            </a:r>
-            <a:r>
-              <a:rPr lang="en-US" u="sng" dirty="0"/>
-              <a:t>Pull</a:t>
-            </a:r>
-            <a:r>
-              <a:rPr lang="en-US" dirty="0"/>
-              <a:t> Request to merge changes </a:t>
-            </a:r>
-            <a:r>
-              <a:rPr lang="en-US" dirty="0" smtClean="0"/>
-              <a:t>to </a:t>
-            </a:r>
-            <a:r>
-              <a:rPr lang="en-US" smtClean="0"/>
-              <a:t>original branch</a:t>
-            </a:r>
-            <a:endParaRPr lang="en-US" dirty="0"/>
+              <a:rPr lang="en-US" sz="1600" b="1" dirty="0" smtClean="0"/>
+              <a:t>/[REPO NAME]</a:t>
+            </a:r>
+            <a:endParaRPr lang="en-US" sz="1600" b="1" dirty="0"/>
           </a:p>
           <a:p>
             <a:pPr marL="1257300" lvl="2" indent="-342900">
               <a:buFont typeface="Arial" panose="020B0604020202020204" pitchFamily="34" charset="0"/>
               <a:buChar char="•"/>
             </a:pPr>
-            <a:r>
-              <a:rPr lang="en-US" sz="1600" b="1" dirty="0" err="1"/>
-              <a:t>ie</a:t>
-            </a:r>
-            <a:r>
-              <a:rPr lang="en-US" sz="1600" b="1" dirty="0"/>
-              <a:t>: https://github.com/</a:t>
-            </a:r>
-            <a:r>
-              <a:rPr lang="en-US" sz="1600" b="1" dirty="0">
-                <a:solidFill>
-                  <a:srgbClr val="FF0000"/>
-                </a:solidFill>
-              </a:rPr>
-              <a:t>kansasgis</a:t>
-            </a:r>
-            <a:r>
-              <a:rPr lang="en-US" sz="1600" b="1" dirty="0"/>
-              <a:t>/GithubWebinar_2015</a:t>
-            </a:r>
-            <a:endParaRPr lang="en-US" sz="1600" dirty="0"/>
+            <a:endParaRPr lang="en-US" dirty="0"/>
           </a:p>
         </p:txBody>
       </p:sp>
     </p:spTree>
     <p:extLst>
       <p:ext uri="{BB962C8B-B14F-4D97-AF65-F5344CB8AC3E}">
-        <p14:creationId xmlns:p14="http://schemas.microsoft.com/office/powerpoint/2010/main" val="4202873809"/>
+        <p14:creationId xmlns:p14="http://schemas.microsoft.com/office/powerpoint/2010/main" val="1311636492"/>
       </p:ext>
     </p:extLst>
   </p:cSld>
@@ -7004,7 +6933,7 @@
           <a:p>
             <a:r>
               <a:rPr lang="en-US" sz="2800" dirty="0" smtClean="0"/>
-              <a:t>GitHub: Common Maintenance</a:t>
+              <a:t>GitHub: Demonstration- Another’s Code/Data</a:t>
             </a:r>
             <a:endParaRPr lang="en-US" sz="2800" dirty="0"/>
           </a:p>
@@ -7054,7 +6983,7 @@
         <p:spPr>
           <a:xfrm>
             <a:off x="990600" y="1143000"/>
-            <a:ext cx="7162800" cy="3139321"/>
+            <a:ext cx="7162800" cy="2769989"/>
           </a:xfrm>
           <a:prstGeom prst="rect">
             <a:avLst/>
@@ -7071,56 +7000,177 @@
               <a:buAutoNum type="arabicParenR"/>
             </a:pPr>
             <a:r>
-              <a:rPr lang="en-US" b="1" dirty="0" smtClean="0"/>
-              <a:t>Issue Tracking</a:t>
+              <a:rPr lang="en-US" dirty="0" smtClean="0"/>
+              <a:t>Fork </a:t>
+            </a:r>
+            <a:r>
+              <a:rPr lang="en-US" dirty="0"/>
+              <a:t>another </a:t>
+            </a:r>
+            <a:r>
+              <a:rPr lang="en-US" dirty="0" smtClean="0"/>
+              <a:t>repository</a:t>
             </a:r>
           </a:p>
           <a:p>
             <a:pPr marL="800100" lvl="1" indent="-342900">
+              <a:buFont typeface="Wingdings" panose="05000000000000000000" pitchFamily="2" charset="2"/>
+              <a:buChar char="Ø"/>
+            </a:pPr>
+            <a:r>
+              <a:rPr lang="en-US" dirty="0" smtClean="0"/>
+              <a:t>Fork a repo in which you would like to collaborate</a:t>
+            </a:r>
+            <a:endParaRPr lang="en-US" dirty="0"/>
+          </a:p>
+          <a:p>
+            <a:pPr marL="800100" lvl="1" indent="-342900">
+              <a:buFont typeface="Wingdings" panose="05000000000000000000" pitchFamily="2" charset="2"/>
+              <a:buChar char="q"/>
+            </a:pPr>
+            <a:r>
+              <a:rPr lang="en-US" u="sng" dirty="0"/>
+              <a:t>Edit</a:t>
+            </a:r>
+            <a:r>
+              <a:rPr lang="en-US" dirty="0"/>
+              <a:t> your forked local repository </a:t>
+            </a:r>
+          </a:p>
+          <a:p>
+            <a:pPr marL="1257300" lvl="2" indent="-342900">
               <a:buFont typeface="Arial" panose="020B0604020202020204" pitchFamily="34" charset="0"/>
               <a:buChar char="•"/>
             </a:pPr>
             <a:r>
-              <a:rPr lang="en-US" b="1" dirty="0" smtClean="0"/>
-              <a:t>GitHub provides an easy interface for tracking issues for each repository. </a:t>
-            </a:r>
-          </a:p>
-          <a:p>
-            <a:pPr marL="342900" indent="-342900">
-              <a:buAutoNum type="arabicParenR"/>
+              <a:rPr lang="en-US" sz="1600" b="1" dirty="0" err="1"/>
+              <a:t>ie</a:t>
+            </a:r>
+            <a:r>
+              <a:rPr lang="en-US" sz="1600" b="1" dirty="0"/>
+              <a:t>: </a:t>
+            </a:r>
+            <a:r>
+              <a:rPr lang="en-US" sz="1600" b="1" dirty="0">
+                <a:solidFill>
+                  <a:srgbClr val="FF0000"/>
+                </a:solidFill>
+              </a:rPr>
+              <a:t>C:</a:t>
+            </a:r>
+            <a:r>
+              <a:rPr lang="en-US" sz="1600" b="1" dirty="0"/>
+              <a:t>\Users\addavis\Documents\GitHub\GithubWebinar_2015</a:t>
+            </a:r>
+            <a:endParaRPr lang="en-US" b="1" dirty="0"/>
+          </a:p>
+          <a:p>
+            <a:pPr marL="800100" lvl="1" indent="-342900">
+              <a:buFont typeface="Wingdings" panose="05000000000000000000" pitchFamily="2" charset="2"/>
+              <a:buChar char="q"/>
             </a:pPr>
             <a:r>
-              <a:rPr lang="en-US" b="1" dirty="0" smtClean="0"/>
-              <a:t>Pull Requests</a:t>
-            </a:r>
-          </a:p>
-          <a:p>
-            <a:pPr marL="800100" lvl="1" indent="-342900">
+              <a:rPr lang="en-US" u="sng" dirty="0"/>
+              <a:t>Commit</a:t>
+            </a:r>
+            <a:r>
+              <a:rPr lang="en-US" dirty="0"/>
+              <a:t> changes to your local repository </a:t>
+            </a:r>
+          </a:p>
+          <a:p>
+            <a:pPr marL="1257300" lvl="2" indent="-342900">
               <a:buFont typeface="Arial" panose="020B0604020202020204" pitchFamily="34" charset="0"/>
               <a:buChar char="•"/>
             </a:pPr>
             <a:r>
-              <a:rPr lang="en-US" b="1" dirty="0" smtClean="0"/>
-              <a:t>Since repositories can be “forked,” the owner of the any repository has the right to accept/reject any Pull Request from a “branch”. If accepted, the file changes will be “merged” into the master repository (</a:t>
-            </a:r>
-            <a:r>
-              <a:rPr lang="en-US" sz="1200" b="1" dirty="0" err="1" smtClean="0"/>
+              <a:rPr lang="en-US" dirty="0"/>
+              <a:t>As Kristen mentioned, a lot like a “save file”</a:t>
+            </a:r>
+          </a:p>
+          <a:p>
+            <a:pPr marL="800100" lvl="1" indent="-342900">
+              <a:buFont typeface="Wingdings" panose="05000000000000000000" pitchFamily="2" charset="2"/>
+              <a:buChar char="q"/>
+            </a:pPr>
+            <a:r>
+              <a:rPr lang="en-US" u="sng" dirty="0"/>
+              <a:t>Sync</a:t>
+            </a:r>
+            <a:r>
+              <a:rPr lang="en-US" dirty="0"/>
+              <a:t> changes to your GitHub repository</a:t>
+            </a:r>
+          </a:p>
+          <a:p>
+            <a:pPr marL="1257300" lvl="2" indent="-342900">
+              <a:buFont typeface="Arial" panose="020B0604020202020204" pitchFamily="34" charset="0"/>
+              <a:buChar char="•"/>
+            </a:pPr>
+            <a:r>
+              <a:rPr lang="en-US" sz="1600" b="1" dirty="0" err="1"/>
               <a:t>ie</a:t>
             </a:r>
             <a:r>
-              <a:rPr lang="en-US" sz="1200" b="1" dirty="0" smtClean="0"/>
-              <a:t>: </a:t>
-            </a:r>
-            <a:r>
-              <a:rPr lang="en-US" sz="1200" b="1" dirty="0"/>
-              <a:t>https://</a:t>
-            </a:r>
-            <a:r>
-              <a:rPr lang="en-US" sz="1200" b="1" dirty="0" smtClean="0"/>
-              <a:t>github.com/</a:t>
-            </a:r>
-            <a:r>
-              <a:rPr lang="en-US" sz="1200" b="1" dirty="0" smtClean="0">
+              <a:rPr lang="en-US" sz="1600" b="1" dirty="0"/>
+              <a:t>: https://github.com/</a:t>
+            </a:r>
+            <a:r>
+              <a:rPr lang="en-US" sz="1600" b="1" dirty="0">
+                <a:solidFill>
+                  <a:srgbClr val="FF0000"/>
+                </a:solidFill>
+              </a:rPr>
+              <a:t>davisgis</a:t>
+            </a:r>
+            <a:r>
+              <a:rPr lang="en-US" sz="1600" b="1" dirty="0"/>
+              <a:t>/GithubWebinar_2015</a:t>
+            </a:r>
+            <a:endParaRPr lang="en-US" b="1" dirty="0"/>
+          </a:p>
+          <a:p>
+            <a:pPr marL="800100" lvl="1" indent="-342900">
+              <a:buFont typeface="Wingdings" panose="05000000000000000000" pitchFamily="2" charset="2"/>
+              <a:buChar char="q"/>
+            </a:pPr>
+            <a:r>
+              <a:rPr lang="en-US" dirty="0"/>
+              <a:t>Create </a:t>
+            </a:r>
+            <a:r>
+              <a:rPr lang="en-US" u="sng" dirty="0"/>
+              <a:t>Pull</a:t>
+            </a:r>
+            <a:r>
+              <a:rPr lang="en-US" dirty="0"/>
+              <a:t> Request to merge changes </a:t>
+            </a:r>
+            <a:r>
+              <a:rPr lang="en-US" dirty="0" smtClean="0"/>
+              <a:t>to </a:t>
+            </a:r>
+            <a:r>
+              <a:rPr lang="en-US" smtClean="0"/>
+              <a:t>original branch</a:t>
+            </a:r>
+            <a:endParaRPr lang="en-US" dirty="0"/>
+          </a:p>
+          <a:p>
+            <a:pPr marL="1257300" lvl="2" indent="-342900">
+              <a:buFont typeface="Arial" panose="020B0604020202020204" pitchFamily="34" charset="0"/>
+              <a:buChar char="•"/>
+            </a:pPr>
+            <a:r>
+              <a:rPr lang="en-US" sz="1600" b="1" dirty="0" err="1"/>
+              <a:t>ie</a:t>
+            </a:r>
+            <a:r>
+              <a:rPr lang="en-US" sz="1600" b="1" dirty="0"/>
+              <a:t>: https://github.com/</a:t>
+            </a:r>
+            <a:r>
+              <a:rPr lang="en-US" sz="1600" b="1" dirty="0">
                 <a:solidFill>
                   <a:srgbClr val="FF0000"/>
                 </a:solidFill>
@@ -7128,34 +7178,17 @@
               <a:t>kansasgis</a:t>
             </a:r>
             <a:r>
-              <a:rPr lang="en-US" sz="1200" b="1" dirty="0" smtClean="0"/>
-              <a:t>/GithubWebinar_2015)</a:t>
-            </a:r>
-            <a:endParaRPr lang="en-US" sz="1200" dirty="0"/>
-          </a:p>
-          <a:p>
-            <a:pPr marL="800100" lvl="1" indent="-342900">
-              <a:buFont typeface="Arial" panose="020B0604020202020204" pitchFamily="34" charset="0"/>
-              <a:buChar char="•"/>
-            </a:pPr>
-            <a:endParaRPr lang="en-US" dirty="0" smtClean="0"/>
-          </a:p>
-          <a:p>
-            <a:endParaRPr lang="en-US" dirty="0"/>
-          </a:p>
-          <a:p>
-            <a:pPr marL="285750" indent="-285750">
-              <a:buFont typeface="Arial" panose="020B0604020202020204" pitchFamily="34" charset="0"/>
-              <a:buChar char="•"/>
-            </a:pPr>
-            <a:endParaRPr lang="en-US" dirty="0"/>
+              <a:rPr lang="en-US" sz="1600" b="1" dirty="0"/>
+              <a:t>/GithubWebinar_2015</a:t>
+            </a:r>
+            <a:endParaRPr lang="en-US" sz="1600" dirty="0"/>
           </a:p>
         </p:txBody>
       </p:sp>
     </p:spTree>
     <p:extLst>
       <p:ext uri="{BB962C8B-B14F-4D97-AF65-F5344CB8AC3E}">
-        <p14:creationId xmlns:p14="http://schemas.microsoft.com/office/powerpoint/2010/main" val="2180282305"/>
+        <p14:creationId xmlns:p14="http://schemas.microsoft.com/office/powerpoint/2010/main" val="4202873809"/>
       </p:ext>
     </p:extLst>
   </p:cSld>
@@ -7209,7 +7242,7 @@
         </p:nvSpPr>
         <p:spPr>
           <a:xfrm>
-            <a:off x="838200" y="457200"/>
+            <a:off x="888763" y="457200"/>
             <a:ext cx="7239000" cy="523220"/>
           </a:xfrm>
           <a:prstGeom prst="rect">
@@ -7225,7 +7258,7 @@
           <a:p>
             <a:r>
               <a:rPr lang="en-US" sz="2800" dirty="0" smtClean="0"/>
-              <a:t>GitHub: Geographic Data</a:t>
+              <a:t>GitHub: Common Maintenance</a:t>
             </a:r>
             <a:endParaRPr lang="en-US" sz="2800" dirty="0"/>
           </a:p>
@@ -7293,102 +7326,71 @@
             </a:pPr>
             <a:r>
               <a:rPr lang="en-US" b="1" dirty="0" smtClean="0"/>
-              <a:t>Gist</a:t>
+              <a:t>Issue Tracking</a:t>
             </a:r>
           </a:p>
           <a:p>
             <a:pPr marL="800100" lvl="1" indent="-342900">
-              <a:buAutoNum type="arabicParenR"/>
-            </a:pPr>
-            <a:r>
-              <a:rPr lang="en-US" b="1" dirty="0"/>
-              <a:t>Gist</a:t>
-            </a:r>
-            <a:r>
-              <a:rPr lang="en-US" dirty="0"/>
-              <a:t> is a simple way to share snippets and pastes with others. All </a:t>
-            </a:r>
-            <a:r>
-              <a:rPr lang="en-US" dirty="0" err="1"/>
-              <a:t>gists</a:t>
-            </a:r>
-            <a:r>
-              <a:rPr lang="en-US" dirty="0"/>
-              <a:t> are </a:t>
-            </a:r>
-            <a:r>
-              <a:rPr lang="en-US" dirty="0" err="1"/>
-              <a:t>Git</a:t>
-            </a:r>
-            <a:r>
-              <a:rPr lang="en-US" dirty="0"/>
-              <a:t> repositories, so they are automatically versioned, </a:t>
-            </a:r>
-            <a:r>
-              <a:rPr lang="en-US" dirty="0" err="1"/>
-              <a:t>forkable</a:t>
-            </a:r>
-            <a:r>
-              <a:rPr lang="en-US" dirty="0"/>
-              <a:t> and usable from </a:t>
-            </a:r>
-            <a:r>
-              <a:rPr lang="en-US" dirty="0" err="1"/>
-              <a:t>Git</a:t>
-            </a:r>
-            <a:r>
-              <a:rPr lang="en-US" dirty="0" smtClean="0"/>
-              <a:t>.</a:t>
-            </a:r>
-          </a:p>
-          <a:p>
-            <a:pPr marL="1257300" lvl="2" indent="-342900">
               <a:buFont typeface="Arial" panose="020B0604020202020204" pitchFamily="34" charset="0"/>
               <a:buChar char="•"/>
             </a:pPr>
             <a:r>
               <a:rPr lang="en-US" b="1" dirty="0" smtClean="0"/>
-              <a:t>Public</a:t>
-            </a:r>
-          </a:p>
-          <a:p>
-            <a:pPr marL="1257300" lvl="2" indent="-342900">
+              <a:t>GitHub provides an easy interface for tracking issues for each repository. </a:t>
+            </a:r>
+          </a:p>
+          <a:p>
+            <a:pPr marL="342900" indent="-342900">
+              <a:buAutoNum type="arabicParenR"/>
+            </a:pPr>
+            <a:r>
+              <a:rPr lang="en-US" b="1" dirty="0" smtClean="0"/>
+              <a:t>Pull Requests</a:t>
+            </a:r>
+          </a:p>
+          <a:p>
+            <a:pPr marL="800100" lvl="1" indent="-342900">
               <a:buFont typeface="Arial" panose="020B0604020202020204" pitchFamily="34" charset="0"/>
               <a:buChar char="•"/>
             </a:pPr>
             <a:r>
               <a:rPr lang="en-US" b="1" dirty="0" smtClean="0"/>
-              <a:t>Secret</a:t>
-            </a:r>
+              <a:t>Since repositories can be “forked,” the owner of the any repository has the right to accept/reject any Pull Request from a “branch”. If accepted, the file changes will be “merged” into the master repository (</a:t>
+            </a:r>
+            <a:r>
+              <a:rPr lang="en-US" sz="1200" b="1" dirty="0" err="1" smtClean="0"/>
+              <a:t>ie</a:t>
+            </a:r>
+            <a:r>
+              <a:rPr lang="en-US" sz="1200" b="1" dirty="0" smtClean="0"/>
+              <a:t>: </a:t>
+            </a:r>
+            <a:r>
+              <a:rPr lang="en-US" sz="1200" b="1" dirty="0"/>
+              <a:t>https://</a:t>
+            </a:r>
+            <a:r>
+              <a:rPr lang="en-US" sz="1200" b="1" dirty="0" smtClean="0"/>
+              <a:t>github.com/</a:t>
+            </a:r>
+            <a:r>
+              <a:rPr lang="en-US" sz="1200" b="1" dirty="0" smtClean="0">
+                <a:solidFill>
+                  <a:srgbClr val="FF0000"/>
+                </a:solidFill>
+              </a:rPr>
+              <a:t>kansasgis</a:t>
+            </a:r>
+            <a:r>
+              <a:rPr lang="en-US" sz="1200" b="1" dirty="0" smtClean="0"/>
+              <a:t>/GithubWebinar_2015)</a:t>
+            </a:r>
+            <a:endParaRPr lang="en-US" sz="1200" dirty="0"/>
           </a:p>
           <a:p>
             <a:pPr marL="800100" lvl="1" indent="-342900">
-              <a:buAutoNum type="arabicParenR"/>
-            </a:pPr>
-            <a:r>
-              <a:rPr lang="en-US" b="1" dirty="0" err="1" smtClean="0"/>
-              <a:t>GeoJSON</a:t>
-            </a:r>
-            <a:endParaRPr lang="en-US" b="1" dirty="0" smtClean="0"/>
-          </a:p>
-          <a:p>
-            <a:pPr marL="1257300" lvl="2" indent="-342900">
               <a:buFont typeface="Arial" panose="020B0604020202020204" pitchFamily="34" charset="0"/>
               <a:buChar char="•"/>
-            </a:pPr>
-            <a:r>
-              <a:rPr lang="en-US" dirty="0"/>
-              <a:t>http://</a:t>
-            </a:r>
-            <a:r>
-              <a:rPr lang="en-US" dirty="0" smtClean="0"/>
-              <a:t>syriaca.org/api-documentation/index.html</a:t>
-            </a:r>
-            <a:endParaRPr lang="en-US" b="1" dirty="0" smtClean="0"/>
-          </a:p>
-          <a:p>
-            <a:pPr marL="342900" indent="-342900">
-              <a:buAutoNum type="arabicParenR"/>
             </a:pPr>
             <a:endParaRPr lang="en-US" dirty="0" smtClean="0"/>
           </a:p>
@@ -7407,7 +7409,7 @@
     </p:spTree>
     <p:extLst>
       <p:ext uri="{BB962C8B-B14F-4D97-AF65-F5344CB8AC3E}">
-        <p14:creationId xmlns:p14="http://schemas.microsoft.com/office/powerpoint/2010/main" val="361872571"/>
+        <p14:creationId xmlns:p14="http://schemas.microsoft.com/office/powerpoint/2010/main" val="2180282305"/>
       </p:ext>
     </p:extLst>
   </p:cSld>
@@ -7553,8 +7555,17 @@
             </a:r>
           </a:p>
           <a:p>
-            <a:r>
-              <a:rPr lang="en-US" dirty="0" smtClean="0"/>
+            <a:pPr marL="0" indent="0">
+              <a:buNone/>
+            </a:pPr>
+            <a:endParaRPr lang="en-US" dirty="0" smtClean="0"/>
+          </a:p>
+          <a:p>
+            <a:pPr marL="0" indent="0" algn="ctr">
+              <a:buNone/>
+            </a:pPr>
+            <a:r>
+              <a:rPr lang="en-US" sz="3200" b="1" dirty="0" smtClean="0"/>
               <a:t>magicgis.org</a:t>
             </a:r>
           </a:p>
@@ -7563,7 +7574,7 @@
     </p:spTree>
     <p:extLst>
       <p:ext uri="{BB962C8B-B14F-4D97-AF65-F5344CB8AC3E}">
-        <p14:creationId xmlns:p14="http://schemas.microsoft.com/office/powerpoint/2010/main" val="4164713223"/>
+        <p14:creationId xmlns:p14="http://schemas.microsoft.com/office/powerpoint/2010/main" val="377134129"/>
       </p:ext>
     </p:extLst>
   </p:cSld>
@@ -7912,7 +7923,7 @@
                                         <p:tgtEl>
                                           <p:spTgt spid="3">
                                             <p:txEl>
-                                              <p:pRg st="6" end="6"/>
+                                              <p:pRg st="7" end="7"/>
                                             </p:txEl>
                                           </p:spTgt>
                                         </p:tgtEl>
@@ -7958,6 +7969,258 @@
 </p:sld>
 </file>
 
+<file path=ppt/slides/slide20.xml><?xml version="1.0" encoding="utf-8"?>
+<p:sld xmlns:a="http://schemas.openxmlformats.org/drawingml/2006/main" xmlns:r="http://schemas.openxmlformats.org/officeDocument/2006/relationships" xmlns:p="http://schemas.openxmlformats.org/presentationml/2006/main">
+  <p:cSld>
+    <p:spTree>
+      <p:nvGrpSpPr>
+        <p:cNvPr id="1" name=""/>
+        <p:cNvGrpSpPr/>
+        <p:nvPr/>
+      </p:nvGrpSpPr>
+      <p:grpSpPr>
+        <a:xfrm>
+          <a:off x="0" y="0"/>
+          <a:ext cx="0" cy="0"/>
+          <a:chOff x="0" y="0"/>
+          <a:chExt cx="0" cy="0"/>
+        </a:xfrm>
+      </p:grpSpPr>
+      <p:sp>
+        <p:nvSpPr>
+          <p:cNvPr id="2" name="TextBox 1"/>
+          <p:cNvSpPr txBox="1"/>
+          <p:nvPr/>
+        </p:nvSpPr>
+        <p:spPr>
+          <a:xfrm>
+            <a:off x="838200" y="457200"/>
+            <a:ext cx="7239000" cy="523220"/>
+          </a:xfrm>
+          <a:prstGeom prst="rect">
+            <a:avLst/>
+          </a:prstGeom>
+          <a:noFill/>
+        </p:spPr>
+        <p:txBody>
+          <a:bodyPr wrap="square" rtlCol="0">
+            <a:spAutoFit/>
+          </a:bodyPr>
+          <a:lstStyle/>
+          <a:p>
+            <a:r>
+              <a:rPr lang="en-US" sz="2800" dirty="0" smtClean="0"/>
+              <a:t>GitHub: Geographic Data</a:t>
+            </a:r>
+            <a:endParaRPr lang="en-US" sz="2800" dirty="0"/>
+          </a:p>
+        </p:txBody>
+      </p:sp>
+      <p:cxnSp>
+        <p:nvCxnSpPr>
+          <p:cNvPr id="4" name="Straight Connector 3"/>
+          <p:cNvCxnSpPr/>
+          <p:nvPr/>
+        </p:nvCxnSpPr>
+        <p:spPr>
+          <a:xfrm>
+            <a:off x="990600" y="980420"/>
+            <a:ext cx="7162800" cy="0"/>
+          </a:xfrm>
+          <a:prstGeom prst="line">
+            <a:avLst/>
+          </a:prstGeom>
+          <a:ln>
+            <a:solidFill>
+              <a:schemeClr val="accent5"/>
+            </a:solidFill>
+          </a:ln>
+        </p:spPr>
+        <p:style>
+          <a:lnRef idx="1">
+            <a:schemeClr val="accent1"/>
+          </a:lnRef>
+          <a:fillRef idx="0">
+            <a:schemeClr val="accent1"/>
+          </a:fillRef>
+          <a:effectRef idx="0">
+            <a:schemeClr val="accent1"/>
+          </a:effectRef>
+          <a:fontRef idx="minor">
+            <a:schemeClr val="tx1"/>
+          </a:fontRef>
+        </p:style>
+      </p:cxnSp>
+      <p:sp>
+        <p:nvSpPr>
+          <p:cNvPr id="5" name="TextBox 4"/>
+          <p:cNvSpPr txBox="1"/>
+          <p:nvPr/>
+        </p:nvSpPr>
+        <p:spPr>
+          <a:xfrm>
+            <a:off x="990600" y="1143000"/>
+            <a:ext cx="7162800" cy="3139321"/>
+          </a:xfrm>
+          <a:prstGeom prst="rect">
+            <a:avLst/>
+          </a:prstGeom>
+          <a:noFill/>
+        </p:spPr>
+        <p:txBody>
+          <a:bodyPr wrap="square" rtlCol="0">
+            <a:spAutoFit/>
+          </a:bodyPr>
+          <a:lstStyle/>
+          <a:p>
+            <a:pPr marL="342900" indent="-342900">
+              <a:buAutoNum type="arabicParenR"/>
+            </a:pPr>
+            <a:r>
+              <a:rPr lang="en-US" b="1" dirty="0" smtClean="0"/>
+              <a:t>Gist</a:t>
+            </a:r>
+          </a:p>
+          <a:p>
+            <a:pPr marL="800100" lvl="1" indent="-342900">
+              <a:buAutoNum type="arabicParenR"/>
+            </a:pPr>
+            <a:r>
+              <a:rPr lang="en-US" b="1" dirty="0"/>
+              <a:t>Gist</a:t>
+            </a:r>
+            <a:r>
+              <a:rPr lang="en-US" dirty="0"/>
+              <a:t> is a simple way to share snippets and pastes with others. All </a:t>
+            </a:r>
+            <a:r>
+              <a:rPr lang="en-US" dirty="0" err="1"/>
+              <a:t>gists</a:t>
+            </a:r>
+            <a:r>
+              <a:rPr lang="en-US" dirty="0"/>
+              <a:t> are </a:t>
+            </a:r>
+            <a:r>
+              <a:rPr lang="en-US" dirty="0" err="1"/>
+              <a:t>Git</a:t>
+            </a:r>
+            <a:r>
+              <a:rPr lang="en-US" dirty="0"/>
+              <a:t> repositories, so they are automatically versioned, </a:t>
+            </a:r>
+            <a:r>
+              <a:rPr lang="en-US" dirty="0" err="1"/>
+              <a:t>forkable</a:t>
+            </a:r>
+            <a:r>
+              <a:rPr lang="en-US" dirty="0"/>
+              <a:t> and usable from </a:t>
+            </a:r>
+            <a:r>
+              <a:rPr lang="en-US" dirty="0" err="1"/>
+              <a:t>Git</a:t>
+            </a:r>
+            <a:r>
+              <a:rPr lang="en-US" dirty="0" smtClean="0"/>
+              <a:t>.</a:t>
+            </a:r>
+          </a:p>
+          <a:p>
+            <a:pPr marL="1257300" lvl="2" indent="-342900">
+              <a:buFont typeface="Arial" panose="020B0604020202020204" pitchFamily="34" charset="0"/>
+              <a:buChar char="•"/>
+            </a:pPr>
+            <a:r>
+              <a:rPr lang="en-US" b="1" dirty="0" smtClean="0"/>
+              <a:t>Public</a:t>
+            </a:r>
+          </a:p>
+          <a:p>
+            <a:pPr marL="1257300" lvl="2" indent="-342900">
+              <a:buFont typeface="Arial" panose="020B0604020202020204" pitchFamily="34" charset="0"/>
+              <a:buChar char="•"/>
+            </a:pPr>
+            <a:r>
+              <a:rPr lang="en-US" b="1" dirty="0" smtClean="0"/>
+              <a:t>Secret</a:t>
+            </a:r>
+          </a:p>
+          <a:p>
+            <a:pPr marL="800100" lvl="1" indent="-342900">
+              <a:buAutoNum type="arabicParenR"/>
+            </a:pPr>
+            <a:r>
+              <a:rPr lang="en-US" b="1" dirty="0" err="1" smtClean="0"/>
+              <a:t>GeoJSON</a:t>
+            </a:r>
+            <a:endParaRPr lang="en-US" b="1" dirty="0" smtClean="0"/>
+          </a:p>
+          <a:p>
+            <a:pPr marL="1257300" lvl="2" indent="-342900">
+              <a:buFont typeface="Arial" panose="020B0604020202020204" pitchFamily="34" charset="0"/>
+              <a:buChar char="•"/>
+            </a:pPr>
+            <a:r>
+              <a:rPr lang="en-US" dirty="0"/>
+              <a:t>http://</a:t>
+            </a:r>
+            <a:r>
+              <a:rPr lang="en-US" dirty="0" smtClean="0"/>
+              <a:t>syriaca.org/api-documentation/index.html</a:t>
+            </a:r>
+            <a:endParaRPr lang="en-US" b="1" dirty="0" smtClean="0"/>
+          </a:p>
+          <a:p>
+            <a:pPr marL="342900" indent="-342900">
+              <a:buAutoNum type="arabicParenR"/>
+            </a:pPr>
+            <a:endParaRPr lang="en-US" dirty="0" smtClean="0"/>
+          </a:p>
+          <a:p>
+            <a:endParaRPr lang="en-US" dirty="0"/>
+          </a:p>
+          <a:p>
+            <a:pPr marL="285750" indent="-285750">
+              <a:buFont typeface="Arial" panose="020B0604020202020204" pitchFamily="34" charset="0"/>
+              <a:buChar char="•"/>
+            </a:pPr>
+            <a:endParaRPr lang="en-US" dirty="0"/>
+          </a:p>
+        </p:txBody>
+      </p:sp>
+    </p:spTree>
+    <p:extLst>
+      <p:ext uri="{BB962C8B-B14F-4D97-AF65-F5344CB8AC3E}">
+        <p14:creationId xmlns:p14="http://schemas.microsoft.com/office/powerpoint/2010/main" val="361872571"/>
+      </p:ext>
+    </p:extLst>
+  </p:cSld>
+  <p:clrMapOvr>
+    <a:masterClrMapping/>
+  </p:clrMapOvr>
+  <mc:AlternateContent xmlns:mc="http://schemas.openxmlformats.org/markup-compatibility/2006" xmlns:p14="http://schemas.microsoft.com/office/powerpoint/2010/main">
+    <mc:Choice Requires="p14">
+      <p:transition spd="slow" p14:dur="1300">
+        <p14:pan dir="u"/>
+      </p:transition>
+    </mc:Choice>
+    <mc:Fallback xmlns="">
+      <p:transition spd="slow">
+        <p:fade/>
+      </p:transition>
+    </mc:Fallback>
+  </mc:AlternateContent>
+  <p:timing>
+    <p:tnLst>
+      <p:par>
+        <p:cTn id="1" dur="indefinite" restart="never" nodeType="tmRoot"/>
+      </p:par>
+    </p:tnLst>
+  </p:timing>
+</p:sld>
+</file>
+
 <file path=ppt/slides/slide3.xml><?xml version="1.0" encoding="utf-8"?>
 <p:sld xmlns:a="http://schemas.openxmlformats.org/drawingml/2006/main" xmlns:r="http://schemas.openxmlformats.org/officeDocument/2006/relationships" xmlns:p="http://schemas.openxmlformats.org/presentationml/2006/main">
   <p:cSld>
@@ -8059,7 +8322,7 @@
     </p:spTree>
     <p:extLst>
       <p:ext uri="{BB962C8B-B14F-4D97-AF65-F5344CB8AC3E}">
-        <p14:creationId xmlns:p14="http://schemas.microsoft.com/office/powerpoint/2010/main" val="1624860427"/>
+        <p14:creationId xmlns:p14="http://schemas.microsoft.com/office/powerpoint/2010/main" val="2143250677"/>
       </p:ext>
     </p:extLst>
   </p:cSld>
@@ -8382,7 +8645,33 @@
           <a:p>
             <a:r>
               <a:rPr lang="en-US" dirty="0" smtClean="0"/>
-              <a:t>Blah, blah, blah</a:t>
+              <a:t>Primary tool used in today’s software code development</a:t>
+            </a:r>
+          </a:p>
+          <a:p>
+            <a:r>
+              <a:rPr lang="en-US" dirty="0" smtClean="0"/>
+              <a:t>Used for managing and sharing software code</a:t>
+            </a:r>
+          </a:p>
+          <a:p>
+            <a:r>
+              <a:rPr lang="en-US" dirty="0" smtClean="0"/>
+              <a:t>Used in collaborative software coding efforts</a:t>
+            </a:r>
+          </a:p>
+          <a:p>
+            <a:r>
+              <a:rPr lang="en-US" dirty="0" smtClean="0"/>
+              <a:t>Can also be used for sharing other files (e.g., </a:t>
+            </a:r>
+            <a:r>
+              <a:rPr lang="en-US" dirty="0" err="1" smtClean="0"/>
+              <a:t>doco</a:t>
+            </a:r>
+            <a:r>
+              <a:rPr lang="en-US" dirty="0" smtClean="0"/>
+              <a:t>)</a:t>
             </a:r>
           </a:p>
         </p:txBody>
@@ -8390,7 +8679,7 @@
     </p:spTree>
     <p:extLst>
       <p:ext uri="{BB962C8B-B14F-4D97-AF65-F5344CB8AC3E}">
-        <p14:creationId xmlns:p14="http://schemas.microsoft.com/office/powerpoint/2010/main" val="470507153"/>
+        <p14:creationId xmlns:p14="http://schemas.microsoft.com/office/powerpoint/2010/main" val="4216706940"/>
       </p:ext>
     </p:extLst>
   </p:cSld>
@@ -8466,6 +8755,153 @@
                       </p:childTnLst>
                     </p:cTn>
                   </p:par>
+                  <p:par>
+                    <p:cTn id="7" fill="hold">
+                      <p:stCondLst>
+                        <p:cond delay="indefinite"/>
+                      </p:stCondLst>
+                      <p:childTnLst>
+                        <p:par>
+                          <p:cTn id="8" fill="hold">
+                            <p:stCondLst>
+                              <p:cond delay="0"/>
+                            </p:stCondLst>
+                            <p:childTnLst>
+                              <p:par>
+                                <p:cTn id="9" presetID="1" presetClass="entr" presetSubtype="0" fill="hold" nodeType="clickEffect">
+                                  <p:stCondLst>
+                                    <p:cond delay="0"/>
+                                  </p:stCondLst>
+                                  <p:childTnLst>
+                                    <p:set>
+                                      <p:cBhvr>
+                                        <p:cTn id="10" dur="1" fill="hold">
+                                          <p:stCondLst>
+                                            <p:cond delay="0"/>
+                                          </p:stCondLst>
+                                        </p:cTn>
+                                        <p:tgtEl>
+                                          <p:spTgt spid="3">
+                                            <p:txEl>
+                                              <p:pRg st="1" end="1"/>
+                                            </p:txEl>
+                                          </p:spTgt>
+                                        </p:tgtEl>
+                                        <p:attrNameLst>
+                                          <p:attrName>style.visibility</p:attrName>
+                                        </p:attrNameLst>
+                                      </p:cBhvr>
+                                      <p:to>
+                                        <p:strVal val="visible"/>
+                                      </p:to>
+                                    </p:set>
+                                  </p:childTnLst>
+                                </p:cTn>
+                              </p:par>
+                            </p:childTnLst>
+                          </p:cTn>
+                        </p:par>
+                      </p:childTnLst>
+                    </p:cTn>
+                  </p:par>
+                  <p:par>
+                    <p:cTn id="11" fill="hold">
+                      <p:stCondLst>
+                        <p:cond delay="indefinite"/>
+                      </p:stCondLst>
+                      <p:childTnLst>
+                        <p:par>
+                          <p:cTn id="12" fill="hold">
+                            <p:stCondLst>
+                              <p:cond delay="0"/>
+                            </p:stCondLst>
+                            <p:childTnLst>
+                              <p:par>
+                                <p:cTn id="13" presetID="1" presetClass="entr" presetSubtype="0" fill="hold" nodeType="clickEffect">
+                                  <p:stCondLst>
+                                    <p:cond delay="0"/>
+                                  </p:stCondLst>
+                                  <p:childTnLst>
+                                    <p:set>
+                                      <p:cBhvr>
+                                        <p:cTn id="14" dur="1" fill="hold">
+                                          <p:stCondLst>
+                                            <p:cond delay="0"/>
+                                          </p:stCondLst>
+                                        </p:cTn>
+                                        <p:tgtEl>
+                                          <p:spTgt spid="3">
+                                            <p:txEl>
+                                              <p:pRg st="2" end="2"/>
+                                            </p:txEl>
+                                          </p:spTgt>
+                                        </p:tgtEl>
+                                        <p:attrNameLst>
+                                          <p:attrName>style.visibility</p:attrName>
+                                        </p:attrNameLst>
+                                      </p:cBhvr>
+                                      <p:to>
+                                        <p:strVal val="visible"/>
+                                      </p:to>
+                                    </p:set>
+                                  </p:childTnLst>
+                                </p:cTn>
+                              </p:par>
+                            </p:childTnLst>
+                          </p:cTn>
+                        </p:par>
+                      </p:childTnLst>
+                    </p:cTn>
+                  </p:par>
+                  <p:par>
+                    <p:cTn id="15" fill="hold">
+                      <p:stCondLst>
+                        <p:cond delay="indefinite"/>
+                      </p:stCondLst>
+                      <p:childTnLst>
+                        <p:par>
+                          <p:cTn id="16" fill="hold">
+                            <p:stCondLst>
+                              <p:cond delay="0"/>
+                            </p:stCondLst>
+                            <p:childTnLst>
+                              <p:par>
+                                <p:cTn id="17" presetID="1" presetClass="entr" presetSubtype="0" fill="hold" nodeType="clickEffect">
+                                  <p:stCondLst>
+                                    <p:cond delay="0"/>
+                                  </p:stCondLst>
+                                  <p:childTnLst>
+                                    <p:set>
+                                      <p:cBhvr>
+                                        <p:cTn id="18" dur="1" fill="hold">
+                                          <p:stCondLst>
+                                            <p:cond delay="0"/>
+                                          </p:stCondLst>
+                                        </p:cTn>
+                                        <p:tgtEl>
+                                          <p:spTgt spid="3">
+                                            <p:txEl>
+                                              <p:pRg st="3" end="3"/>
+                                            </p:txEl>
+                                          </p:spTgt>
+                                        </p:tgtEl>
+                                        <p:attrNameLst>
+                                          <p:attrName>style.visibility</p:attrName>
+                                        </p:attrNameLst>
+                                      </p:cBhvr>
+                                      <p:to>
+                                        <p:strVal val="visible"/>
+                                      </p:to>
+                                    </p:set>
+                                  </p:childTnLst>
+                                </p:cTn>
+                              </p:par>
+                            </p:childTnLst>
+                          </p:cTn>
+                        </p:par>
+                      </p:childTnLst>
+                    </p:cTn>
+                  </p:par>
                 </p:childTnLst>
               </p:cTn>
               <p:prevCondLst>
@@ -8517,7 +8953,7 @@
         <p:spPr>
           <a:xfrm>
             <a:off x="1018921" y="5486400"/>
-            <a:ext cx="2826415" cy="646331"/>
+            <a:ext cx="3579313" cy="646331"/>
           </a:xfrm>
           <a:prstGeom prst="rect">
             <a:avLst/>
@@ -8535,7 +8971,7 @@
                 <a:latin typeface="Arial"/>
                 <a:cs typeface="Arial"/>
               </a:rPr>
-              <a:t>Introductions</a:t>
+              <a:t>Today’s Webinar</a:t>
             </a:r>
             <a:endParaRPr lang="en-US" sz="3600" dirty="0">
               <a:latin typeface="Arial"/>
@@ -8566,19 +9002,29 @@
           <a:p>
             <a:r>
               <a:rPr lang="en-US" dirty="0" smtClean="0"/>
-              <a:t>Kristen Jordan-Koenig</a:t>
+              <a:t>Will show how GitHub works</a:t>
+            </a:r>
+          </a:p>
+          <a:p>
+            <a:r>
+              <a:rPr lang="en-US" dirty="0" smtClean="0"/>
+              <a:t>How it can be used inside a GIS department</a:t>
+            </a:r>
+          </a:p>
+          <a:p>
+            <a:r>
+              <a:rPr lang="en-US" dirty="0" smtClean="0"/>
+              <a:t>Using it to share and track code</a:t>
             </a:r>
           </a:p>
           <a:p>
             <a:r>
               <a:rPr lang="en-US" smtClean="0"/>
-              <a:t>Anthony Davis</a:t>
-            </a:r>
-          </a:p>
-          <a:p>
+              <a:t>Using GitHub </a:t>
+            </a:r>
             <a:r>
               <a:rPr lang="en-US" dirty="0" smtClean="0"/>
-              <a:t>Blah, blah, blah</a:t>
+              <a:t>to share and track documents and data</a:t>
             </a:r>
           </a:p>
         </p:txBody>
@@ -8586,7 +9032,7 @@
     </p:spTree>
     <p:extLst>
       <p:ext uri="{BB962C8B-B14F-4D97-AF65-F5344CB8AC3E}">
-        <p14:creationId xmlns:p14="http://schemas.microsoft.com/office/powerpoint/2010/main" val="431466716"/>
+        <p14:creationId xmlns:p14="http://schemas.microsoft.com/office/powerpoint/2010/main" val="1472700022"/>
       </p:ext>
     </p:extLst>
   </p:cSld>
@@ -8641,7 +9087,7 @@
                                         <p:tgtEl>
                                           <p:spTgt spid="3">
                                             <p:txEl>
-                                              <p:pRg st="2" end="2"/>
+                                              <p:pRg st="0" end="0"/>
                                             </p:txEl>
                                           </p:spTgt>
                                         </p:tgtEl>
@@ -8690,7 +9136,7 @@
                                         <p:tgtEl>
                                           <p:spTgt spid="3">
                                             <p:txEl>
-                                              <p:pRg st="0" end="0"/>
+                                              <p:pRg st="1" end="1"/>
                                             </p:txEl>
                                           </p:spTgt>
                                         </p:tgtEl>
@@ -8739,7 +9185,56 @@
                                         <p:tgtEl>
                                           <p:spTgt spid="3">
                                             <p:txEl>
-                                              <p:pRg st="1" end="1"/>
+                                              <p:pRg st="2" end="2"/>
+                                            </p:txEl>
+                                          </p:spTgt>
+                                        </p:tgtEl>
+                                        <p:attrNameLst>
+                                          <p:attrName>style.visibility</p:attrName>
+                                        </p:attrNameLst>
+                                      </p:cBhvr>
+                                      <p:to>
+                                        <p:strVal val="visible"/>
+                                      </p:to>
+                                    </p:set>
+                                  </p:childTnLst>
+                                </p:cTn>
+                              </p:par>
+                            </p:childTnLst>
+                          </p:cTn>
+                        </p:par>
+                      </p:childTnLst>
+                    </p:cTn>
+                  </p:par>
+                  <p:par>
+                    <p:cTn id="15" fill="hold">
+                      <p:stCondLst>
+                        <p:cond delay="indefinite"/>
+                      </p:stCondLst>
+                      <p:childTnLst>
+                        <p:par>
+                          <p:cTn id="16" fill="hold">
+                            <p:stCondLst>
+                              <p:cond delay="0"/>
+                            </p:stCondLst>
+                            <p:childTnLst>
+                              <p:par>
+                                <p:cTn id="17" presetID="1" presetClass="entr" presetSubtype="0" fill="hold" nodeType="clickEffect">
+                                  <p:stCondLst>
+                                    <p:cond delay="0"/>
+                                  </p:stCondLst>
+                                  <p:childTnLst>
+                                    <p:set>
+                                      <p:cBhvr>
+                                        <p:cTn id="18" dur="1" fill="hold">
+                                          <p:stCondLst>
+                                            <p:cond delay="0"/>
+                                          </p:stCondLst>
+                                        </p:cTn>
+                                        <p:tgtEl>
+                                          <p:spTgt spid="3">
+                                            <p:txEl>
+                                              <p:pRg st="3" end="3"/>
                                             </p:txEl>
                                           </p:spTgt>
                                         </p:tgtEl>
@@ -8810,6 +9305,469 @@
         </p:nvSpPr>
         <p:spPr>
           <a:xfrm>
+            <a:off x="1018921" y="5486400"/>
+            <a:ext cx="5416868" cy="646331"/>
+          </a:xfrm>
+          <a:prstGeom prst="rect">
+            <a:avLst/>
+          </a:prstGeom>
+          <a:noFill/>
+        </p:spPr>
+        <p:txBody>
+          <a:bodyPr wrap="none" rtlCol="0">
+            <a:spAutoFit/>
+          </a:bodyPr>
+          <a:lstStyle/>
+          <a:p>
+            <a:r>
+              <a:rPr lang="en-US" sz="3600" dirty="0" smtClean="0">
+                <a:latin typeface="Arial"/>
+                <a:cs typeface="Arial"/>
+              </a:rPr>
+              <a:t>Presenters Extraordinaire</a:t>
+            </a:r>
+            <a:endParaRPr lang="en-US" sz="3600" dirty="0">
+              <a:latin typeface="Arial"/>
+              <a:cs typeface="Arial"/>
+            </a:endParaRPr>
+          </a:p>
+        </p:txBody>
+      </p:sp>
+      <p:sp>
+        <p:nvSpPr>
+          <p:cNvPr id="3" name="Content Placeholder 2"/>
+          <p:cNvSpPr>
+            <a:spLocks noGrp="1"/>
+          </p:cNvSpPr>
+          <p:nvPr>
+            <p:ph idx="1"/>
+          </p:nvPr>
+        </p:nvSpPr>
+        <p:spPr>
+          <a:xfrm>
+            <a:off x="762000" y="685800"/>
+            <a:ext cx="7543800" cy="4343400"/>
+          </a:xfrm>
+        </p:spPr>
+        <p:txBody>
+          <a:bodyPr/>
+          <a:lstStyle/>
+          <a:p>
+            <a:r>
+              <a:rPr lang="en-US" dirty="0" smtClean="0"/>
+              <a:t>Kristen Jordan-Koenig</a:t>
+            </a:r>
+          </a:p>
+          <a:p>
+            <a:pPr lvl="1"/>
+            <a:r>
+              <a:rPr lang="en-US" sz="2000" dirty="0" smtClean="0"/>
+              <a:t>GIS Specialist</a:t>
+            </a:r>
+          </a:p>
+          <a:p>
+            <a:pPr lvl="1"/>
+            <a:r>
+              <a:rPr lang="en-US" sz="2000" dirty="0" smtClean="0"/>
+              <a:t>Kansas Data Access &amp; Support Center</a:t>
+            </a:r>
+          </a:p>
+          <a:p>
+            <a:r>
+              <a:rPr lang="en-US" dirty="0" smtClean="0"/>
+              <a:t>Anthony Davis</a:t>
+            </a:r>
+          </a:p>
+          <a:p>
+            <a:pPr lvl="1"/>
+            <a:r>
+              <a:rPr lang="en-US" sz="2000" dirty="0" smtClean="0"/>
+              <a:t>Software Development Manager</a:t>
+            </a:r>
+          </a:p>
+          <a:p>
+            <a:pPr lvl="1"/>
+            <a:r>
+              <a:rPr lang="en-US" sz="2000" dirty="0" smtClean="0"/>
+              <a:t>Arkansas Game &amp; Fish Commission</a:t>
+            </a:r>
+          </a:p>
+        </p:txBody>
+      </p:sp>
+    </p:spTree>
+    <p:extLst>
+      <p:ext uri="{BB962C8B-B14F-4D97-AF65-F5344CB8AC3E}">
+        <p14:creationId xmlns:p14="http://schemas.microsoft.com/office/powerpoint/2010/main" val="607262900"/>
+      </p:ext>
+    </p:extLst>
+  </p:cSld>
+  <p:clrMapOvr>
+    <a:masterClrMapping/>
+  </p:clrMapOvr>
+  <mc:AlternateContent xmlns:mc="http://schemas.openxmlformats.org/markup-compatibility/2006" xmlns:p14="http://schemas.microsoft.com/office/powerpoint/2010/main">
+    <mc:Choice Requires="p14">
+      <p:transition spd="slow" p14:dur="1300">
+        <p14:pan dir="u"/>
+      </p:transition>
+    </mc:Choice>
+    <mc:Fallback xmlns="">
+      <p:transition spd="slow">
+        <p:fade/>
+      </p:transition>
+    </mc:Fallback>
+  </mc:AlternateContent>
+  <p:timing>
+    <p:tnLst>
+      <p:par>
+        <p:cTn id="1" dur="indefinite" restart="never" nodeType="tmRoot">
+          <p:childTnLst>
+            <p:seq concurrent="1" nextAc="seek">
+              <p:cTn id="2" dur="indefinite" nodeType="mainSeq">
+                <p:childTnLst>
+                  <p:par>
+                    <p:cTn id="3" fill="hold">
+                      <p:stCondLst>
+                        <p:cond delay="indefinite"/>
+                      </p:stCondLst>
+                      <p:childTnLst>
+                        <p:par>
+                          <p:cTn id="4" fill="hold">
+                            <p:stCondLst>
+                              <p:cond delay="0"/>
+                            </p:stCondLst>
+                            <p:childTnLst>
+                              <p:par>
+                                <p:cTn id="5" presetID="1" presetClass="entr" presetSubtype="0" fill="hold" nodeType="clickEffect">
+                                  <p:stCondLst>
+                                    <p:cond delay="0"/>
+                                  </p:stCondLst>
+                                  <p:childTnLst>
+                                    <p:set>
+                                      <p:cBhvr>
+                                        <p:cTn id="6" dur="1" fill="hold">
+                                          <p:stCondLst>
+                                            <p:cond delay="0"/>
+                                          </p:stCondLst>
+                                        </p:cTn>
+                                        <p:tgtEl>
+                                          <p:spTgt spid="3">
+                                            <p:txEl>
+                                              <p:pRg st="0" end="0"/>
+                                            </p:txEl>
+                                          </p:spTgt>
+                                        </p:tgtEl>
+                                        <p:attrNameLst>
+                                          <p:attrName>style.visibility</p:attrName>
+                                        </p:attrNameLst>
+                                      </p:cBhvr>
+                                      <p:to>
+                                        <p:strVal val="visible"/>
+                                      </p:to>
+                                    </p:set>
+                                  </p:childTnLst>
+                                </p:cTn>
+                              </p:par>
+                            </p:childTnLst>
+                          </p:cTn>
+                        </p:par>
+                      </p:childTnLst>
+                    </p:cTn>
+                  </p:par>
+                  <p:par>
+                    <p:cTn id="7" fill="hold">
+                      <p:stCondLst>
+                        <p:cond delay="indefinite"/>
+                      </p:stCondLst>
+                      <p:childTnLst>
+                        <p:par>
+                          <p:cTn id="8" fill="hold">
+                            <p:stCondLst>
+                              <p:cond delay="0"/>
+                            </p:stCondLst>
+                            <p:childTnLst>
+                              <p:par>
+                                <p:cTn id="9" presetID="1" presetClass="entr" presetSubtype="0" fill="hold" nodeType="clickEffect">
+                                  <p:stCondLst>
+                                    <p:cond delay="0"/>
+                                  </p:stCondLst>
+                                  <p:childTnLst>
+                                    <p:set>
+                                      <p:cBhvr>
+                                        <p:cTn id="10" dur="1" fill="hold">
+                                          <p:stCondLst>
+                                            <p:cond delay="0"/>
+                                          </p:stCondLst>
+                                        </p:cTn>
+                                        <p:tgtEl>
+                                          <p:spTgt spid="3">
+                                            <p:txEl>
+                                              <p:pRg st="1" end="1"/>
+                                            </p:txEl>
+                                          </p:spTgt>
+                                        </p:tgtEl>
+                                        <p:attrNameLst>
+                                          <p:attrName>style.visibility</p:attrName>
+                                        </p:attrNameLst>
+                                      </p:cBhvr>
+                                      <p:to>
+                                        <p:strVal val="visible"/>
+                                      </p:to>
+                                    </p:set>
+                                  </p:childTnLst>
+                                </p:cTn>
+                              </p:par>
+                            </p:childTnLst>
+                          </p:cTn>
+                        </p:par>
+                      </p:childTnLst>
+                    </p:cTn>
+                  </p:par>
+                  <p:par>
+                    <p:cTn id="11" fill="hold">
+                      <p:stCondLst>
+                        <p:cond delay="indefinite"/>
+                      </p:stCondLst>
+                      <p:childTnLst>
+                        <p:par>
+                          <p:cTn id="12" fill="hold">
+                            <p:stCondLst>
+                              <p:cond delay="0"/>
+                            </p:stCondLst>
+                            <p:childTnLst>
+                              <p:par>
+                                <p:cTn id="13" presetID="1" presetClass="entr" presetSubtype="0" fill="hold" nodeType="clickEffect">
+                                  <p:stCondLst>
+                                    <p:cond delay="0"/>
+                                  </p:stCondLst>
+                                  <p:childTnLst>
+                                    <p:set>
+                                      <p:cBhvr>
+                                        <p:cTn id="14" dur="1" fill="hold">
+                                          <p:stCondLst>
+                                            <p:cond delay="0"/>
+                                          </p:stCondLst>
+                                        </p:cTn>
+                                        <p:tgtEl>
+                                          <p:spTgt spid="3">
+                                            <p:txEl>
+                                              <p:pRg st="2" end="2"/>
+                                            </p:txEl>
+                                          </p:spTgt>
+                                        </p:tgtEl>
+                                        <p:attrNameLst>
+                                          <p:attrName>style.visibility</p:attrName>
+                                        </p:attrNameLst>
+                                      </p:cBhvr>
+                                      <p:to>
+                                        <p:strVal val="visible"/>
+                                      </p:to>
+                                    </p:set>
+                                  </p:childTnLst>
+                                </p:cTn>
+                              </p:par>
+                            </p:childTnLst>
+                          </p:cTn>
+                        </p:par>
+                      </p:childTnLst>
+                    </p:cTn>
+                  </p:par>
+                  <p:par>
+                    <p:cTn id="15" fill="hold">
+                      <p:stCondLst>
+                        <p:cond delay="indefinite"/>
+                      </p:stCondLst>
+                      <p:childTnLst>
+                        <p:par>
+                          <p:cTn id="16" fill="hold">
+                            <p:stCondLst>
+                              <p:cond delay="0"/>
+                            </p:stCondLst>
+                            <p:childTnLst>
+                              <p:par>
+                                <p:cTn id="17" presetID="1" presetClass="entr" presetSubtype="0" fill="hold" nodeType="clickEffect">
+                                  <p:stCondLst>
+                                    <p:cond delay="0"/>
+                                  </p:stCondLst>
+                                  <p:childTnLst>
+                                    <p:set>
+                                      <p:cBhvr>
+                                        <p:cTn id="18" dur="1" fill="hold">
+                                          <p:stCondLst>
+                                            <p:cond delay="0"/>
+                                          </p:stCondLst>
+                                        </p:cTn>
+                                        <p:tgtEl>
+                                          <p:spTgt spid="3">
+                                            <p:txEl>
+                                              <p:pRg st="3" end="3"/>
+                                            </p:txEl>
+                                          </p:spTgt>
+                                        </p:tgtEl>
+                                        <p:attrNameLst>
+                                          <p:attrName>style.visibility</p:attrName>
+                                        </p:attrNameLst>
+                                      </p:cBhvr>
+                                      <p:to>
+                                        <p:strVal val="visible"/>
+                                      </p:to>
+                                    </p:set>
+                                  </p:childTnLst>
+                                </p:cTn>
+                              </p:par>
+                            </p:childTnLst>
+                          </p:cTn>
+                        </p:par>
+                      </p:childTnLst>
+                    </p:cTn>
+                  </p:par>
+                  <p:par>
+                    <p:cTn id="19" fill="hold">
+                      <p:stCondLst>
+                        <p:cond delay="indefinite"/>
+                      </p:stCondLst>
+                      <p:childTnLst>
+                        <p:par>
+                          <p:cTn id="20" fill="hold">
+                            <p:stCondLst>
+                              <p:cond delay="0"/>
+                            </p:stCondLst>
+                            <p:childTnLst>
+                              <p:par>
+                                <p:cTn id="21" presetID="1" presetClass="entr" presetSubtype="0" fill="hold" nodeType="clickEffect">
+                                  <p:stCondLst>
+                                    <p:cond delay="0"/>
+                                  </p:stCondLst>
+                                  <p:childTnLst>
+                                    <p:set>
+                                      <p:cBhvr>
+                                        <p:cTn id="22" dur="1" fill="hold">
+                                          <p:stCondLst>
+                                            <p:cond delay="0"/>
+                                          </p:stCondLst>
+                                        </p:cTn>
+                                        <p:tgtEl>
+                                          <p:spTgt spid="3">
+                                            <p:txEl>
+                                              <p:pRg st="4" end="4"/>
+                                            </p:txEl>
+                                          </p:spTgt>
+                                        </p:tgtEl>
+                                        <p:attrNameLst>
+                                          <p:attrName>style.visibility</p:attrName>
+                                        </p:attrNameLst>
+                                      </p:cBhvr>
+                                      <p:to>
+                                        <p:strVal val="visible"/>
+                                      </p:to>
+                                    </p:set>
+                                  </p:childTnLst>
+                                </p:cTn>
+                              </p:par>
+                            </p:childTnLst>
+                          </p:cTn>
+                        </p:par>
+                      </p:childTnLst>
+                    </p:cTn>
+                  </p:par>
+                  <p:par>
+                    <p:cTn id="23" fill="hold">
+                      <p:stCondLst>
+                        <p:cond delay="indefinite"/>
+                      </p:stCondLst>
+                      <p:childTnLst>
+                        <p:par>
+                          <p:cTn id="24" fill="hold">
+                            <p:stCondLst>
+                              <p:cond delay="0"/>
+                            </p:stCondLst>
+                            <p:childTnLst>
+                              <p:par>
+                                <p:cTn id="25" presetID="1" presetClass="entr" presetSubtype="0" fill="hold" nodeType="clickEffect">
+                                  <p:stCondLst>
+                                    <p:cond delay="0"/>
+                                  </p:stCondLst>
+                                  <p:childTnLst>
+                                    <p:set>
+                                      <p:cBhvr>
+                                        <p:cTn id="26" dur="1" fill="hold">
+                                          <p:stCondLst>
+                                            <p:cond delay="0"/>
+                                          </p:stCondLst>
+                                        </p:cTn>
+                                        <p:tgtEl>
+                                          <p:spTgt spid="3">
+                                            <p:txEl>
+                                              <p:pRg st="5" end="5"/>
+                                            </p:txEl>
+                                          </p:spTgt>
+                                        </p:tgtEl>
+                                        <p:attrNameLst>
+                                          <p:attrName>style.visibility</p:attrName>
+                                        </p:attrNameLst>
+                                      </p:cBhvr>
+                                      <p:to>
+                                        <p:strVal val="visible"/>
+                                      </p:to>
+                                    </p:set>
+                                  </p:childTnLst>
+                                </p:cTn>
+                              </p:par>
+                            </p:childTnLst>
+                          </p:cTn>
+                        </p:par>
+                      </p:childTnLst>
+                    </p:cTn>
+                  </p:par>
+                </p:childTnLst>
+              </p:cTn>
+              <p:prevCondLst>
+                <p:cond evt="onPrev" delay="0">
+                  <p:tgtEl>
+                    <p:sldTgt/>
+                  </p:tgtEl>
+                </p:cond>
+              </p:prevCondLst>
+              <p:nextCondLst>
+                <p:cond evt="onNext" delay="0">
+                  <p:tgtEl>
+                    <p:sldTgt/>
+                  </p:tgtEl>
+                </p:cond>
+              </p:nextCondLst>
+            </p:seq>
+          </p:childTnLst>
+        </p:cTn>
+      </p:par>
+    </p:tnLst>
+  </p:timing>
+</p:sld>
+</file>
+
+<file path=ppt/slides/slide7.xml><?xml version="1.0" encoding="utf-8"?>
+<p:sld xmlns:a="http://schemas.openxmlformats.org/drawingml/2006/main" xmlns:r="http://schemas.openxmlformats.org/officeDocument/2006/relationships" xmlns:p="http://schemas.openxmlformats.org/presentationml/2006/main">
+  <p:cSld>
+    <p:spTree>
+      <p:nvGrpSpPr>
+        <p:cNvPr id="1" name=""/>
+        <p:cNvGrpSpPr/>
+        <p:nvPr/>
+      </p:nvGrpSpPr>
+      <p:grpSpPr>
+        <a:xfrm>
+          <a:off x="0" y="0"/>
+          <a:ext cx="0" cy="0"/>
+          <a:chOff x="0" y="0"/>
+          <a:chExt cx="0" cy="0"/>
+        </a:xfrm>
+      </p:grpSpPr>
+      <p:sp>
+        <p:nvSpPr>
+          <p:cNvPr id="2" name="TextBox 1"/>
+          <p:cNvSpPr txBox="1"/>
+          <p:nvPr/>
+        </p:nvSpPr>
+        <p:spPr>
+          <a:xfrm>
             <a:off x="914400" y="457200"/>
             <a:ext cx="7239000" cy="523220"/>
           </a:xfrm>
@@ -8891,11 +9849,7 @@
           <a:p>
             <a:r>
               <a:rPr lang="en-US" dirty="0" smtClean="0"/>
-              <a:t>Platform for sharing &amp; tracking </a:t>
-            </a:r>
-            <a:r>
-              <a:rPr lang="en-US" dirty="0" smtClean="0"/>
-              <a:t>projects</a:t>
+              <a:t>Platform for sharing &amp; tracking projects</a:t>
             </a:r>
           </a:p>
           <a:p>
@@ -8903,7 +9857,6 @@
               <a:rPr lang="en-US" dirty="0" smtClean="0"/>
               <a:t>Revision/version control system (VCS)</a:t>
             </a:r>
-            <a:endParaRPr lang="en-US" dirty="0" smtClean="0"/>
           </a:p>
           <a:p>
             <a:endParaRPr lang="en-US" dirty="0"/>
@@ -9037,239 +9990,6 @@
     <p:extLst>
       <p:ext uri="{BB962C8B-B14F-4D97-AF65-F5344CB8AC3E}">
         <p14:creationId xmlns:p14="http://schemas.microsoft.com/office/powerpoint/2010/main" val="2191191186"/>
-      </p:ext>
-    </p:extLst>
-  </p:cSld>
-  <p:clrMapOvr>
-    <a:masterClrMapping/>
-  </p:clrMapOvr>
-  <mc:AlternateContent xmlns:mc="http://schemas.openxmlformats.org/markup-compatibility/2006" xmlns:p14="http://schemas.microsoft.com/office/powerpoint/2010/main">
-    <mc:Choice Requires="p14">
-      <p:transition spd="slow" p14:dur="1300">
-        <p14:pan dir="u"/>
-      </p:transition>
-    </mc:Choice>
-    <mc:Fallback xmlns="">
-      <p:transition spd="slow">
-        <p:fade/>
-      </p:transition>
-    </mc:Fallback>
-  </mc:AlternateContent>
-  <p:timing>
-    <p:tnLst>
-      <p:par>
-        <p:cTn id="1" dur="indefinite" restart="never" nodeType="tmRoot"/>
-      </p:par>
-    </p:tnLst>
-  </p:timing>
-</p:sld>
-</file>
-
-<file path=ppt/slides/slide7.xml><?xml version="1.0" encoding="utf-8"?>
-<p:sld xmlns:a="http://schemas.openxmlformats.org/drawingml/2006/main" xmlns:r="http://schemas.openxmlformats.org/officeDocument/2006/relationships" xmlns:p="http://schemas.openxmlformats.org/presentationml/2006/main">
-  <p:cSld>
-    <p:spTree>
-      <p:nvGrpSpPr>
-        <p:cNvPr id="1" name=""/>
-        <p:cNvGrpSpPr/>
-        <p:nvPr/>
-      </p:nvGrpSpPr>
-      <p:grpSpPr>
-        <a:xfrm>
-          <a:off x="0" y="0"/>
-          <a:ext cx="0" cy="0"/>
-          <a:chOff x="0" y="0"/>
-          <a:chExt cx="0" cy="0"/>
-        </a:xfrm>
-      </p:grpSpPr>
-      <p:sp>
-        <p:nvSpPr>
-          <p:cNvPr id="2" name="TextBox 1"/>
-          <p:cNvSpPr txBox="1"/>
-          <p:nvPr/>
-        </p:nvSpPr>
-        <p:spPr>
-          <a:xfrm>
-            <a:off x="914400" y="457200"/>
-            <a:ext cx="7239000" cy="523220"/>
-          </a:xfrm>
-          <a:prstGeom prst="rect">
-            <a:avLst/>
-          </a:prstGeom>
-          <a:noFill/>
-        </p:spPr>
-        <p:txBody>
-          <a:bodyPr wrap="square" rtlCol="0">
-            <a:spAutoFit/>
-          </a:bodyPr>
-          <a:lstStyle/>
-          <a:p>
-            <a:r>
-              <a:rPr lang="en-US" sz="2800" dirty="0" smtClean="0"/>
-              <a:t>GitHub</a:t>
-            </a:r>
-            <a:endParaRPr lang="en-US" sz="2800" dirty="0"/>
-          </a:p>
-        </p:txBody>
-      </p:sp>
-      <p:cxnSp>
-        <p:nvCxnSpPr>
-          <p:cNvPr id="4" name="Straight Connector 3"/>
-          <p:cNvCxnSpPr/>
-          <p:nvPr/>
-        </p:nvCxnSpPr>
-        <p:spPr>
-          <a:xfrm>
-            <a:off x="990600" y="980420"/>
-            <a:ext cx="7162800" cy="0"/>
-          </a:xfrm>
-          <a:prstGeom prst="line">
-            <a:avLst/>
-          </a:prstGeom>
-          <a:ln>
-            <a:solidFill>
-              <a:schemeClr val="accent5"/>
-            </a:solidFill>
-          </a:ln>
-        </p:spPr>
-        <p:style>
-          <a:lnRef idx="1">
-            <a:schemeClr val="accent1"/>
-          </a:lnRef>
-          <a:fillRef idx="0">
-            <a:schemeClr val="accent1"/>
-          </a:fillRef>
-          <a:effectRef idx="0">
-            <a:schemeClr val="accent1"/>
-          </a:effectRef>
-          <a:fontRef idx="minor">
-            <a:schemeClr val="tx1"/>
-          </a:fontRef>
-        </p:style>
-      </p:cxnSp>
-      <p:sp>
-        <p:nvSpPr>
-          <p:cNvPr id="5" name="TextBox 4"/>
-          <p:cNvSpPr txBox="1"/>
-          <p:nvPr/>
-        </p:nvSpPr>
-        <p:spPr>
-          <a:xfrm>
-            <a:off x="990600" y="1143000"/>
-            <a:ext cx="7162800" cy="3693319"/>
-          </a:xfrm>
-          <a:prstGeom prst="rect">
-            <a:avLst/>
-          </a:prstGeom>
-          <a:noFill/>
-        </p:spPr>
-        <p:txBody>
-          <a:bodyPr wrap="square" rtlCol="0">
-            <a:spAutoFit/>
-          </a:bodyPr>
-          <a:lstStyle/>
-          <a:p>
-            <a:r>
-              <a:rPr lang="en-US" dirty="0" smtClean="0"/>
-              <a:t>Platform works for any computer documents</a:t>
-            </a:r>
-          </a:p>
-          <a:p>
-            <a:pPr marL="742950" lvl="1" indent="-285750">
-              <a:buFont typeface="Arial" panose="020B0604020202020204" pitchFamily="34" charset="0"/>
-              <a:buChar char="•"/>
-            </a:pPr>
-            <a:r>
-              <a:rPr lang="en-US" dirty="0" smtClean="0"/>
-              <a:t>Word documents</a:t>
-            </a:r>
-          </a:p>
-          <a:p>
-            <a:pPr marL="742950" lvl="1" indent="-285750">
-              <a:buFont typeface="Arial" panose="020B0604020202020204" pitchFamily="34" charset="0"/>
-              <a:buChar char="•"/>
-            </a:pPr>
-            <a:r>
-              <a:rPr lang="en-US" dirty="0" smtClean="0"/>
-              <a:t>Sheet music</a:t>
-            </a:r>
-          </a:p>
-          <a:p>
-            <a:pPr marL="742950" lvl="1" indent="-285750">
-              <a:buFont typeface="Arial" panose="020B0604020202020204" pitchFamily="34" charset="0"/>
-              <a:buChar char="•"/>
-            </a:pPr>
-            <a:r>
-              <a:rPr lang="en-US" dirty="0" smtClean="0"/>
-              <a:t>Geographic data</a:t>
-            </a:r>
-          </a:p>
-          <a:p>
-            <a:pPr marL="742950" lvl="1" indent="-285750">
-              <a:buFont typeface="Arial" panose="020B0604020202020204" pitchFamily="34" charset="0"/>
-              <a:buChar char="•"/>
-            </a:pPr>
-            <a:r>
-              <a:rPr lang="en-US" dirty="0" err="1" smtClean="0"/>
-              <a:t>Powerpoint</a:t>
-            </a:r>
-            <a:r>
-              <a:rPr lang="en-US" dirty="0" smtClean="0"/>
-              <a:t> slides (like this)</a:t>
-            </a:r>
-          </a:p>
-          <a:p>
-            <a:endParaRPr lang="en-US" dirty="0"/>
-          </a:p>
-          <a:p>
-            <a:r>
-              <a:rPr lang="en-US" dirty="0" smtClean="0"/>
-              <a:t>Commonly used for open-source code projects</a:t>
-            </a:r>
-          </a:p>
-          <a:p>
-            <a:endParaRPr lang="en-US" dirty="0" smtClean="0"/>
-          </a:p>
-          <a:p>
-            <a:r>
-              <a:rPr lang="en-US" dirty="0" smtClean="0"/>
-              <a:t>Syncs documents on your computer with documents online</a:t>
-            </a:r>
-          </a:p>
-          <a:p>
-            <a:endParaRPr lang="en-US" dirty="0"/>
-          </a:p>
-          <a:p>
-            <a:r>
-              <a:rPr lang="en-US" dirty="0" smtClean="0"/>
-              <a:t>Awesome for backups and seeing when </a:t>
-            </a:r>
-            <a:r>
-              <a:rPr lang="en-US" smtClean="0"/>
-              <a:t>changes happened</a:t>
-            </a:r>
-            <a:endParaRPr lang="en-US" dirty="0" smtClean="0"/>
-          </a:p>
-          <a:p>
-            <a:pPr marL="742950" lvl="1" indent="-285750">
-              <a:buFont typeface="Arial" panose="020B0604020202020204" pitchFamily="34" charset="0"/>
-              <a:buChar char="•"/>
-            </a:pPr>
-            <a:endParaRPr lang="en-US" dirty="0" smtClean="0"/>
-          </a:p>
-          <a:p>
-            <a:pPr marL="285750" indent="-285750">
-              <a:buFont typeface="Arial" panose="020B0604020202020204" pitchFamily="34" charset="0"/>
-              <a:buChar char="•"/>
-            </a:pPr>
-            <a:endParaRPr lang="en-US" dirty="0"/>
-          </a:p>
-        </p:txBody>
-      </p:sp>
-    </p:spTree>
-    <p:extLst>
-      <p:ext uri="{BB962C8B-B14F-4D97-AF65-F5344CB8AC3E}">
-        <p14:creationId xmlns:p14="http://schemas.microsoft.com/office/powerpoint/2010/main" val="2407111841"/>
       </p:ext>
     </p:extLst>
   </p:cSld>
@@ -9389,7 +10109,7 @@
         <p:spPr>
           <a:xfrm>
             <a:off x="990600" y="1143000"/>
-            <a:ext cx="7162800" cy="2862322"/>
+            <a:ext cx="7162800" cy="3693319"/>
           </a:xfrm>
           <a:prstGeom prst="rect">
             <a:avLst/>
@@ -9404,16 +10124,7 @@
           <a:p>
             <a:r>
               <a:rPr lang="en-US" dirty="0" smtClean="0"/>
-              <a:t>Need a user account (free for basic use, pay for more complex)</a:t>
-            </a:r>
-          </a:p>
-          <a:p>
-            <a:endParaRPr lang="en-US" dirty="0"/>
-          </a:p>
-          <a:p>
-            <a:r>
-              <a:rPr lang="en-US" dirty="0" smtClean="0"/>
-              <a:t>You can follow other’s accounts and projects</a:t>
+              <a:t>Platform works for any computer documents</a:t>
             </a:r>
           </a:p>
           <a:p>
@@ -9422,16 +10133,60 @@
               <a:buChar char="•"/>
             </a:pPr>
             <a:r>
+              <a:rPr lang="en-US" dirty="0" smtClean="0"/>
+              <a:t>Word documents</a:t>
+            </a:r>
+          </a:p>
+          <a:p>
+            <a:pPr marL="742950" lvl="1" indent="-285750">
+              <a:buFont typeface="Arial" panose="020B0604020202020204" pitchFamily="34" charset="0"/>
+              <a:buChar char="•"/>
+            </a:pPr>
+            <a:r>
+              <a:rPr lang="en-US" dirty="0" smtClean="0"/>
+              <a:t>Sheet music</a:t>
+            </a:r>
+          </a:p>
+          <a:p>
+            <a:pPr marL="742950" lvl="1" indent="-285750">
+              <a:buFont typeface="Arial" panose="020B0604020202020204" pitchFamily="34" charset="0"/>
+              <a:buChar char="•"/>
+            </a:pPr>
+            <a:r>
+              <a:rPr lang="en-US" dirty="0" smtClean="0"/>
+              <a:t>Geographic data</a:t>
+            </a:r>
+          </a:p>
+          <a:p>
+            <a:pPr marL="742950" lvl="1" indent="-285750">
+              <a:buFont typeface="Arial" panose="020B0604020202020204" pitchFamily="34" charset="0"/>
+              <a:buChar char="•"/>
+            </a:pPr>
+            <a:r>
               <a:rPr lang="en-US" dirty="0" err="1" smtClean="0"/>
-              <a:t>Esri</a:t>
+              <a:t>Powerpoint</a:t>
             </a:r>
             <a:r>
               <a:rPr lang="en-US" dirty="0" smtClean="0"/>
-              <a:t> </a:t>
-            </a:r>
+              <a:t> slides (like this)</a:t>
+            </a:r>
+          </a:p>
+          <a:p>
+            <a:endParaRPr lang="en-US" dirty="0"/>
+          </a:p>
+          <a:p>
             <a:r>
               <a:rPr lang="en-US" dirty="0" smtClean="0"/>
-              <a:t>uses GitHub</a:t>
+              <a:t>Commonly used for open-source code projects</a:t>
+            </a:r>
+          </a:p>
+          <a:p>
+            <a:endParaRPr lang="en-US" dirty="0" smtClean="0"/>
+          </a:p>
+          <a:p>
+            <a:r>
+              <a:rPr lang="en-US" dirty="0" smtClean="0"/>
+              <a:t>Syncs documents on your computer with documents online</a:t>
             </a:r>
           </a:p>
           <a:p>
@@ -9440,22 +10195,13 @@
           <a:p>
             <a:r>
               <a:rPr lang="en-US" dirty="0" smtClean="0"/>
-              <a:t>Searching is </a:t>
-            </a:r>
-            <a:r>
-              <a:rPr lang="en-US" dirty="0" smtClean="0"/>
-              <a:t>hard, merging/resolving conflicts can be complex</a:t>
+              <a:t>Awesome for backups and seeing when </a:t>
+            </a:r>
+            <a:r>
+              <a:rPr lang="en-US" smtClean="0"/>
+              <a:t>changes happened</a:t>
             </a:r>
             <a:endParaRPr lang="en-US" dirty="0" smtClean="0"/>
-          </a:p>
-          <a:p>
-            <a:endParaRPr lang="en-US" dirty="0"/>
-          </a:p>
-          <a:p>
-            <a:r>
-              <a:rPr lang="en-US" dirty="0" smtClean="0"/>
-              <a:t>You can copy/paste some code &amp; documents from the website</a:t>
-            </a:r>
           </a:p>
           <a:p>
             <a:pPr marL="742950" lvl="1" indent="-285750">
@@ -9476,7 +10222,7 @@
     </p:spTree>
     <p:extLst>
       <p:ext uri="{BB962C8B-B14F-4D97-AF65-F5344CB8AC3E}">
-        <p14:creationId xmlns:p14="http://schemas.microsoft.com/office/powerpoint/2010/main" val="4039995769"/>
+        <p14:creationId xmlns:p14="http://schemas.microsoft.com/office/powerpoint/2010/main" val="2407111841"/>
       </p:ext>
     </p:extLst>
   </p:cSld>
@@ -9546,7 +10292,7 @@
           <a:p>
             <a:r>
               <a:rPr lang="en-US" sz="2800" dirty="0" smtClean="0"/>
-              <a:t>GitHub: Key Definitions</a:t>
+              <a:t>GitHub</a:t>
             </a:r>
             <a:endParaRPr lang="en-US" sz="2800" dirty="0"/>
           </a:p>
@@ -9596,7 +10342,7 @@
         <p:spPr>
           <a:xfrm>
             <a:off x="990600" y="1143000"/>
-            <a:ext cx="7162800" cy="1477328"/>
+            <a:ext cx="7162800" cy="2862322"/>
           </a:xfrm>
           <a:prstGeom prst="rect">
             <a:avLst/>
@@ -9610,16 +10356,8 @@
           <a:lstStyle/>
           <a:p>
             <a:r>
-              <a:rPr lang="en-US" b="1" dirty="0" err="1" smtClean="0"/>
-              <a:t>Git</a:t>
-            </a:r>
-            <a:r>
-              <a:rPr lang="en-US" b="1" dirty="0" smtClean="0"/>
-              <a:t> (n)</a:t>
-            </a:r>
-            <a:r>
               <a:rPr lang="en-US" dirty="0" smtClean="0"/>
-              <a:t>: </a:t>
+              <a:t>Need a user account (free for basic use, pay for more complex)</a:t>
             </a:r>
           </a:p>
           <a:p>
@@ -9628,23 +10366,61 @@
           <a:p>
             <a:r>
               <a:rPr lang="en-US" dirty="0" smtClean="0"/>
-              <a:t>distributed revision control system (version control software, VCS) run from command-line tools. GitHub expanded on </a:t>
-            </a:r>
+              <a:t>You can follow other’s accounts and projects</a:t>
+            </a:r>
+          </a:p>
+          <a:p>
+            <a:pPr marL="742950" lvl="1" indent="-285750">
+              <a:buFont typeface="Arial" panose="020B0604020202020204" pitchFamily="34" charset="0"/>
+              <a:buChar char="•"/>
+            </a:pPr>
             <a:r>
               <a:rPr lang="en-US" dirty="0" err="1" smtClean="0"/>
-              <a:t>Git</a:t>
+              <a:t>Esri</a:t>
             </a:r>
             <a:r>
               <a:rPr lang="en-US" dirty="0" smtClean="0"/>
-              <a:t> and added graphic user interface tools</a:t>
-            </a:r>
+              <a:t> uses GitHub</a:t>
+            </a:r>
+          </a:p>
+          <a:p>
+            <a:endParaRPr lang="en-US" dirty="0"/>
+          </a:p>
+          <a:p>
+            <a:r>
+              <a:rPr lang="en-US" dirty="0" smtClean="0"/>
+              <a:t>Searching is hard, merging/resolving conflicts can be complex</a:t>
+            </a:r>
+          </a:p>
+          <a:p>
+            <a:endParaRPr lang="en-US" dirty="0"/>
+          </a:p>
+          <a:p>
+            <a:r>
+              <a:rPr lang="en-US" dirty="0" smtClean="0"/>
+              <a:t>You can copy/paste some code &amp; documents from the website</a:t>
+            </a:r>
+          </a:p>
+          <a:p>
+            <a:pPr marL="742950" lvl="1" indent="-285750">
+              <a:buFont typeface="Arial" panose="020B0604020202020204" pitchFamily="34" charset="0"/>
+              <a:buChar char="•"/>
+            </a:pPr>
+            <a:endParaRPr lang="en-US" dirty="0" smtClean="0"/>
+          </a:p>
+          <a:p>
+            <a:pPr marL="285750" indent="-285750">
+              <a:buFont typeface="Arial" panose="020B0604020202020204" pitchFamily="34" charset="0"/>
+              <a:buChar char="•"/>
+            </a:pPr>
+            <a:endParaRPr lang="en-US" dirty="0"/>
           </a:p>
         </p:txBody>
       </p:sp>
     </p:spTree>
     <p:extLst>
       <p:ext uri="{BB962C8B-B14F-4D97-AF65-F5344CB8AC3E}">
-        <p14:creationId xmlns:p14="http://schemas.microsoft.com/office/powerpoint/2010/main" val="2336358536"/>
+        <p14:creationId xmlns:p14="http://schemas.microsoft.com/office/powerpoint/2010/main" val="4039995769"/>
       </p:ext>
     </p:extLst>
   </p:cSld>
@@ -10262,7 +11038,7 @@
 </file>
 
 <file path=customXml/itemProps1.xml><?xml version="1.0" encoding="utf-8"?>
-<ds:datastoreItem xmlns:ds="http://schemas.openxmlformats.org/officeDocument/2006/customXml" ds:itemID="{769E63BE-C297-4D58-9F77-01F72B8CE361}">
+<ds:datastoreItem xmlns:ds="http://schemas.openxmlformats.org/officeDocument/2006/customXml" ds:itemID="{E296F241-CF59-4FDC-858A-665AB9D0932B}">
   <ds:schemaRefs>
     <ds:schemaRef ds:uri="ESRI.ArcGIS.Mapping.OfficeIntegration.PowerPointInfo"/>
   </ds:schemaRefs>
@@ -10278,7 +11054,7 @@
 </file>
 
 <file path=customXml/itemProps3.xml><?xml version="1.0" encoding="utf-8"?>
-<ds:datastoreItem xmlns:ds="http://schemas.openxmlformats.org/officeDocument/2006/customXml" ds:itemID="{E296F241-CF59-4FDC-858A-665AB9D0932B}">
+<ds:datastoreItem xmlns:ds="http://schemas.openxmlformats.org/officeDocument/2006/customXml" ds:itemID="{769E63BE-C297-4D58-9F77-01F72B8CE361}">
   <ds:schemaRefs>
     <ds:schemaRef ds:uri="ESRI.ArcGIS.Mapping.OfficeIntegration.PowerPointInfo"/>
   </ds:schemaRefs>
@@ -10286,7 +11062,7 @@
 </file>
 
 <file path=customXml/itemProps4.xml><?xml version="1.0" encoding="utf-8"?>
-<ds:datastoreItem xmlns:ds="http://schemas.openxmlformats.org/officeDocument/2006/customXml" ds:itemID="{E1295731-2C2D-4706-A13A-C59F66C348FE}">
+<ds:datastoreItem xmlns:ds="http://schemas.openxmlformats.org/officeDocument/2006/customXml" ds:itemID="{9037BA00-B0B9-46ED-B894-E24F6F8C453A}">
   <ds:schemaRefs>
     <ds:schemaRef ds:uri="ESRI.ArcGIS.Mapping.OfficeIntegration.PowerPointInfo"/>
   </ds:schemaRefs>

</xml_diff>

<commit_message>
Edits from dress rehearsal
Made edits discussed during dress rehearsal
</commit_message>
<xml_diff>
--- a/MAGIC_GitHub_Webinar.pptx
+++ b/MAGIC_GitHub_Webinar.pptx
@@ -5,7 +5,7 @@
     <p:sldMasterId id="2147483660" r:id="rId5"/>
   </p:sldMasterIdLst>
   <p:notesMasterIdLst>
-    <p:notesMasterId r:id="rId26"/>
+    <p:notesMasterId r:id="rId28"/>
   </p:notesMasterIdLst>
   <p:sldIdLst>
     <p:sldId id="291" r:id="rId6"/>
@@ -28,6 +28,8 @@
     <p:sldId id="303" r:id="rId23"/>
     <p:sldId id="302" r:id="rId24"/>
     <p:sldId id="301" r:id="rId25"/>
+    <p:sldId id="311" r:id="rId26"/>
+    <p:sldId id="310" r:id="rId27"/>
   </p:sldIdLst>
   <p:sldSz cx="9144000" cy="6858000" type="screen4x3"/>
   <p:notesSz cx="6858000" cy="9144000"/>
@@ -128,7 +130,7 @@
   </p:defaultTextStyle>
   <p:extLst>
     <p:ext uri="{EFAFB233-063F-42B5-8137-9DF3F51BA10A}">
-      <p15:sldGuideLst xmlns="" xmlns:p15="http://schemas.microsoft.com/office/powerpoint/2012/main">
+      <p15:sldGuideLst xmlns:p15="http://schemas.microsoft.com/office/powerpoint/2012/main" xmlns="">
         <p15:guide id="1" orient="horz" pos="2160">
           <p15:clr>
             <a:srgbClr val="A4A3A4"/>
@@ -1586,6 +1588,176 @@
               <a:rPr lang="en-US" smtClean="0"/>
               <a:pPr/>
               <a:t>20</a:t>
+            </a:fld>
+            <a:endParaRPr lang="en-US" dirty="0"/>
+          </a:p>
+        </p:txBody>
+      </p:sp>
+    </p:spTree>
+    <p:extLst>
+      <p:ext uri="{BB962C8B-B14F-4D97-AF65-F5344CB8AC3E}">
+        <p14:creationId xmlns:p14="http://schemas.microsoft.com/office/powerpoint/2010/main" val="2265466410"/>
+      </p:ext>
+    </p:extLst>
+  </p:cSld>
+  <p:clrMapOvr>
+    <a:masterClrMapping/>
+  </p:clrMapOvr>
+</p:notes>
+</file>
+
+<file path=ppt/notesSlides/notesSlide21.xml><?xml version="1.0" encoding="utf-8"?>
+<p:notes xmlns:a="http://schemas.openxmlformats.org/drawingml/2006/main" xmlns:r="http://schemas.openxmlformats.org/officeDocument/2006/relationships" xmlns:p="http://schemas.openxmlformats.org/presentationml/2006/main">
+  <p:cSld>
+    <p:spTree>
+      <p:nvGrpSpPr>
+        <p:cNvPr id="1" name=""/>
+        <p:cNvGrpSpPr/>
+        <p:nvPr/>
+      </p:nvGrpSpPr>
+      <p:grpSpPr>
+        <a:xfrm>
+          <a:off x="0" y="0"/>
+          <a:ext cx="0" cy="0"/>
+          <a:chOff x="0" y="0"/>
+          <a:chExt cx="0" cy="0"/>
+        </a:xfrm>
+      </p:grpSpPr>
+      <p:sp>
+        <p:nvSpPr>
+          <p:cNvPr id="2" name="Slide Image Placeholder 1"/>
+          <p:cNvSpPr>
+            <a:spLocks noGrp="1" noRot="1" noChangeAspect="1"/>
+          </p:cNvSpPr>
+          <p:nvPr>
+            <p:ph type="sldImg"/>
+          </p:nvPr>
+        </p:nvSpPr>
+        <p:spPr/>
+      </p:sp>
+      <p:sp>
+        <p:nvSpPr>
+          <p:cNvPr id="3" name="Notes Placeholder 2"/>
+          <p:cNvSpPr>
+            <a:spLocks noGrp="1"/>
+          </p:cNvSpPr>
+          <p:nvPr>
+            <p:ph type="body" idx="1"/>
+          </p:nvPr>
+        </p:nvSpPr>
+        <p:spPr/>
+        <p:txBody>
+          <a:bodyPr/>
+          <a:lstStyle/>
+          <a:p>
+            <a:endParaRPr lang="en-US" dirty="0"/>
+          </a:p>
+        </p:txBody>
+      </p:sp>
+      <p:sp>
+        <p:nvSpPr>
+          <p:cNvPr id="4" name="Slide Number Placeholder 3"/>
+          <p:cNvSpPr>
+            <a:spLocks noGrp="1"/>
+          </p:cNvSpPr>
+          <p:nvPr>
+            <p:ph type="sldNum" sz="quarter" idx="10"/>
+          </p:nvPr>
+        </p:nvSpPr>
+        <p:spPr/>
+        <p:txBody>
+          <a:bodyPr/>
+          <a:lstStyle/>
+          <a:p>
+            <a:fld id="{9B26CD33-4337-4529-948A-94F6960B2374}" type="slidenum">
+              <a:rPr lang="en-US" smtClean="0"/>
+              <a:pPr/>
+              <a:t>21</a:t>
+            </a:fld>
+            <a:endParaRPr lang="en-US" dirty="0"/>
+          </a:p>
+        </p:txBody>
+      </p:sp>
+    </p:spTree>
+    <p:extLst>
+      <p:ext uri="{BB962C8B-B14F-4D97-AF65-F5344CB8AC3E}">
+        <p14:creationId xmlns:p14="http://schemas.microsoft.com/office/powerpoint/2010/main" val="2265466410"/>
+      </p:ext>
+    </p:extLst>
+  </p:cSld>
+  <p:clrMapOvr>
+    <a:masterClrMapping/>
+  </p:clrMapOvr>
+</p:notes>
+</file>
+
+<file path=ppt/notesSlides/notesSlide22.xml><?xml version="1.0" encoding="utf-8"?>
+<p:notes xmlns:a="http://schemas.openxmlformats.org/drawingml/2006/main" xmlns:r="http://schemas.openxmlformats.org/officeDocument/2006/relationships" xmlns:p="http://schemas.openxmlformats.org/presentationml/2006/main">
+  <p:cSld>
+    <p:spTree>
+      <p:nvGrpSpPr>
+        <p:cNvPr id="1" name=""/>
+        <p:cNvGrpSpPr/>
+        <p:nvPr/>
+      </p:nvGrpSpPr>
+      <p:grpSpPr>
+        <a:xfrm>
+          <a:off x="0" y="0"/>
+          <a:ext cx="0" cy="0"/>
+          <a:chOff x="0" y="0"/>
+          <a:chExt cx="0" cy="0"/>
+        </a:xfrm>
+      </p:grpSpPr>
+      <p:sp>
+        <p:nvSpPr>
+          <p:cNvPr id="2" name="Slide Image Placeholder 1"/>
+          <p:cNvSpPr>
+            <a:spLocks noGrp="1" noRot="1" noChangeAspect="1"/>
+          </p:cNvSpPr>
+          <p:nvPr>
+            <p:ph type="sldImg"/>
+          </p:nvPr>
+        </p:nvSpPr>
+        <p:spPr/>
+      </p:sp>
+      <p:sp>
+        <p:nvSpPr>
+          <p:cNvPr id="3" name="Notes Placeholder 2"/>
+          <p:cNvSpPr>
+            <a:spLocks noGrp="1"/>
+          </p:cNvSpPr>
+          <p:nvPr>
+            <p:ph type="body" idx="1"/>
+          </p:nvPr>
+        </p:nvSpPr>
+        <p:spPr/>
+        <p:txBody>
+          <a:bodyPr/>
+          <a:lstStyle/>
+          <a:p>
+            <a:endParaRPr lang="en-US" dirty="0"/>
+          </a:p>
+        </p:txBody>
+      </p:sp>
+      <p:sp>
+        <p:nvSpPr>
+          <p:cNvPr id="4" name="Slide Number Placeholder 3"/>
+          <p:cNvSpPr>
+            <a:spLocks noGrp="1"/>
+          </p:cNvSpPr>
+          <p:nvPr>
+            <p:ph type="sldNum" sz="quarter" idx="10"/>
+          </p:nvPr>
+        </p:nvSpPr>
+        <p:spPr/>
+        <p:txBody>
+          <a:bodyPr/>
+          <a:lstStyle/>
+          <a:p>
+            <a:fld id="{9B26CD33-4337-4529-948A-94F6960B2374}" type="slidenum">
+              <a:rPr lang="en-US" smtClean="0"/>
+              <a:pPr/>
+              <a:t>22</a:t>
             </a:fld>
             <a:endParaRPr lang="en-US" dirty="0"/>
           </a:p>
@@ -5231,7 +5403,12 @@
             <p:ph type="subTitle" idx="1"/>
           </p:nvPr>
         </p:nvSpPr>
-        <p:spPr/>
+        <p:spPr>
+          <a:xfrm>
+            <a:off x="842120" y="3276600"/>
+            <a:ext cx="6858000" cy="2820974"/>
+          </a:xfrm>
+        </p:spPr>
         <p:txBody>
           <a:bodyPr>
             <a:normAutofit/>
@@ -5240,8 +5417,31 @@
           <a:p>
             <a:r>
               <a:rPr lang="en-US" dirty="0" smtClean="0"/>
-              <a:t>July 31, 2015</a:t>
-            </a:r>
+              <a:t>July 31, </a:t>
+            </a:r>
+            <a:r>
+              <a:rPr lang="en-US" dirty="0" smtClean="0"/>
+              <a:t>2015</a:t>
+            </a:r>
+          </a:p>
+          <a:p>
+            <a:endParaRPr lang="en-US" dirty="0" smtClean="0"/>
+          </a:p>
+          <a:p>
+            <a:r>
+              <a:rPr lang="en-US" dirty="0" smtClean="0"/>
+              <a:t>Note: please either dial in to the conference line or use the audio on the webinar line, </a:t>
+            </a:r>
+          </a:p>
+          <a:p>
+            <a:r>
+              <a:rPr lang="en-US" dirty="0" smtClean="0"/>
+              <a:t>but not both</a:t>
+            </a:r>
+            <a:endParaRPr lang="en-US" dirty="0"/>
+          </a:p>
+          <a:p>
+            <a:endParaRPr lang="en-US" dirty="0" smtClean="0"/>
           </a:p>
         </p:txBody>
       </p:sp>
@@ -5267,7 +5467,7 @@
         </p:blipFill>
         <p:spPr>
           <a:xfrm>
-            <a:off x="6705600" y="4572000"/>
+            <a:off x="6858000" y="4572000"/>
             <a:ext cx="1989040" cy="1525574"/>
           </a:xfrm>
           <a:prstGeom prst="rect">
@@ -5607,7 +5807,7 @@
         <p:spPr>
           <a:xfrm>
             <a:off x="990600" y="1143000"/>
-            <a:ext cx="7162800" cy="1754326"/>
+            <a:ext cx="7162800" cy="3139321"/>
           </a:xfrm>
           <a:prstGeom prst="rect">
             <a:avLst/>
@@ -5635,8 +5835,13 @@
           <a:p>
             <a:r>
               <a:rPr lang="en-US" dirty="0" smtClean="0"/>
-              <a:t>place where the history of work is stored</a:t>
-            </a:r>
+              <a:t>place where the history of work is </a:t>
+            </a:r>
+            <a:r>
+              <a:rPr lang="en-US" dirty="0" smtClean="0"/>
+              <a:t>stored online</a:t>
+            </a:r>
+            <a:endParaRPr lang="en-US" dirty="0" smtClean="0"/>
           </a:p>
           <a:p>
             <a:endParaRPr lang="en-US" dirty="0"/>
@@ -5655,6 +5860,40 @@
                 <a:hlinkClick r:id="rId3"/>
               </a:rPr>
               <a:t>here</a:t>
+            </a:r>
+            <a:endParaRPr lang="en-US" dirty="0" smtClean="0"/>
+          </a:p>
+          <a:p>
+            <a:pPr marL="285750" indent="-285750">
+              <a:buFont typeface="Arial" panose="020B0604020202020204" pitchFamily="34" charset="0"/>
+              <a:buChar char="•"/>
+            </a:pPr>
+            <a:endParaRPr lang="en-US" dirty="0"/>
+          </a:p>
+          <a:p>
+            <a:pPr marL="285750" indent="-285750">
+              <a:buFont typeface="Arial" panose="020B0604020202020204" pitchFamily="34" charset="0"/>
+              <a:buChar char="•"/>
+            </a:pPr>
+            <a:endParaRPr lang="en-US" dirty="0" smtClean="0"/>
+          </a:p>
+          <a:p>
+            <a:r>
+              <a:rPr lang="en-US" b="1" dirty="0" smtClean="0"/>
+              <a:t>Clone (n):</a:t>
+            </a:r>
+          </a:p>
+          <a:p>
+            <a:endParaRPr lang="en-US" dirty="0"/>
+          </a:p>
+          <a:p>
+            <a:r>
+              <a:rPr lang="en-US" dirty="0"/>
+              <a:t>c</a:t>
+            </a:r>
+            <a:r>
+              <a:rPr lang="en-US" dirty="0" smtClean="0"/>
+              <a:t>opy of repository that lives on your computer</a:t>
             </a:r>
             <a:endParaRPr lang="en-US" dirty="0" smtClean="0"/>
           </a:p>
@@ -7539,8 +7778,13 @@
           <a:p>
             <a:r>
               <a:rPr lang="en-US" dirty="0" smtClean="0"/>
-              <a:t>Symposium every other year</a:t>
-            </a:r>
+              <a:t>Symposium every other </a:t>
+            </a:r>
+            <a:r>
+              <a:rPr lang="en-US" dirty="0" smtClean="0"/>
+              <a:t>year (even years)</a:t>
+            </a:r>
+            <a:endParaRPr lang="en-US" dirty="0" smtClean="0"/>
           </a:p>
           <a:p>
             <a:r>
@@ -7551,8 +7795,20 @@
           <a:p>
             <a:r>
               <a:rPr lang="en-US" dirty="0" smtClean="0"/>
-              <a:t>You are invited to attend the Symposium (2016)</a:t>
-            </a:r>
+              <a:t>You are invited to attend the </a:t>
+            </a:r>
+            <a:r>
+              <a:rPr lang="en-US" dirty="0" smtClean="0"/>
+              <a:t>2016 Symposium</a:t>
+            </a:r>
+          </a:p>
+          <a:p>
+            <a:pPr lvl="1"/>
+            <a:r>
+              <a:rPr lang="en-US" dirty="0" smtClean="0"/>
+              <a:t>April 24-28, Overland Park, KS (Kansas City)</a:t>
+            </a:r>
+            <a:endParaRPr lang="en-US" dirty="0" smtClean="0"/>
           </a:p>
           <a:p>
             <a:pPr marL="0" indent="0">
@@ -7571,6 +7827,36 @@
           </a:p>
         </p:txBody>
       </p:sp>
+      <p:pic>
+        <p:nvPicPr>
+          <p:cNvPr id="4" name="Picture 3"/>
+          <p:cNvPicPr>
+            <a:picLocks noChangeAspect="1"/>
+          </p:cNvPicPr>
+          <p:nvPr/>
+        </p:nvPicPr>
+        <p:blipFill>
+          <a:blip r:embed="rId3" cstate="print">
+            <a:extLst>
+              <a:ext uri="{28A0092B-C50C-407E-A947-70E740481C1C}">
+                <a14:useLocalDpi xmlns:a14="http://schemas.microsoft.com/office/drawing/2010/main" val="0"/>
+              </a:ext>
+            </a:extLst>
+          </a:blip>
+          <a:stretch>
+            <a:fillRect/>
+          </a:stretch>
+        </p:blipFill>
+        <p:spPr>
+          <a:xfrm>
+            <a:off x="6705600" y="4572000"/>
+            <a:ext cx="1989040" cy="1525574"/>
+          </a:xfrm>
+          <a:prstGeom prst="rect">
+            <a:avLst/>
+          </a:prstGeom>
+        </p:spPr>
+      </p:pic>
     </p:spTree>
     <p:extLst>
       <p:ext uri="{BB962C8B-B14F-4D97-AF65-F5344CB8AC3E}">
@@ -7923,7 +8209,56 @@
                                         <p:tgtEl>
                                           <p:spTgt spid="3">
                                             <p:txEl>
-                                              <p:pRg st="7" end="7"/>
+                                              <p:pRg st="6" end="6"/>
+                                            </p:txEl>
+                                          </p:spTgt>
+                                        </p:tgtEl>
+                                        <p:attrNameLst>
+                                          <p:attrName>style.visibility</p:attrName>
+                                        </p:attrNameLst>
+                                      </p:cBhvr>
+                                      <p:to>
+                                        <p:strVal val="visible"/>
+                                      </p:to>
+                                    </p:set>
+                                  </p:childTnLst>
+                                </p:cTn>
+                              </p:par>
+                            </p:childTnLst>
+                          </p:cTn>
+                        </p:par>
+                      </p:childTnLst>
+                    </p:cTn>
+                  </p:par>
+                  <p:par>
+                    <p:cTn id="31" fill="hold">
+                      <p:stCondLst>
+                        <p:cond delay="indefinite"/>
+                      </p:stCondLst>
+                      <p:childTnLst>
+                        <p:par>
+                          <p:cTn id="32" fill="hold">
+                            <p:stCondLst>
+                              <p:cond delay="0"/>
+                            </p:stCondLst>
+                            <p:childTnLst>
+                              <p:par>
+                                <p:cTn id="33" presetID="1" presetClass="entr" presetSubtype="0" fill="hold" nodeType="clickEffect">
+                                  <p:stCondLst>
+                                    <p:cond delay="0"/>
+                                  </p:stCondLst>
+                                  <p:childTnLst>
+                                    <p:set>
+                                      <p:cBhvr>
+                                        <p:cTn id="34" dur="1" fill="hold">
+                                          <p:stCondLst>
+                                            <p:cond delay="0"/>
+                                          </p:stCondLst>
+                                        </p:cTn>
+                                        <p:tgtEl>
+                                          <p:spTgt spid="3">
+                                            <p:txEl>
+                                              <p:pRg st="8" end="8"/>
                                             </p:txEl>
                                           </p:spTgt>
                                         </p:tgtEl>
@@ -8193,6 +8528,438 @@
     <p:extLst>
       <p:ext uri="{BB962C8B-B14F-4D97-AF65-F5344CB8AC3E}">
         <p14:creationId xmlns:p14="http://schemas.microsoft.com/office/powerpoint/2010/main" val="361872571"/>
+      </p:ext>
+    </p:extLst>
+  </p:cSld>
+  <p:clrMapOvr>
+    <a:masterClrMapping/>
+  </p:clrMapOvr>
+  <mc:AlternateContent xmlns:mc="http://schemas.openxmlformats.org/markup-compatibility/2006" xmlns:p14="http://schemas.microsoft.com/office/powerpoint/2010/main">
+    <mc:Choice Requires="p14">
+      <p:transition spd="slow" p14:dur="1300">
+        <p14:pan dir="u"/>
+      </p:transition>
+    </mc:Choice>
+    <mc:Fallback xmlns="">
+      <p:transition spd="slow">
+        <p:fade/>
+      </p:transition>
+    </mc:Fallback>
+  </mc:AlternateContent>
+  <p:timing>
+    <p:tnLst>
+      <p:par>
+        <p:cTn id="1" dur="indefinite" restart="never" nodeType="tmRoot"/>
+      </p:par>
+    </p:tnLst>
+  </p:timing>
+</p:sld>
+</file>
+
+<file path=ppt/slides/slide21.xml><?xml version="1.0" encoding="utf-8"?>
+<p:sld xmlns:a="http://schemas.openxmlformats.org/drawingml/2006/main" xmlns:r="http://schemas.openxmlformats.org/officeDocument/2006/relationships" xmlns:p="http://schemas.openxmlformats.org/presentationml/2006/main">
+  <p:cSld>
+    <p:spTree>
+      <p:nvGrpSpPr>
+        <p:cNvPr id="1" name=""/>
+        <p:cNvGrpSpPr/>
+        <p:nvPr/>
+      </p:nvGrpSpPr>
+      <p:grpSpPr>
+        <a:xfrm>
+          <a:off x="0" y="0"/>
+          <a:ext cx="0" cy="0"/>
+          <a:chOff x="0" y="0"/>
+          <a:chExt cx="0" cy="0"/>
+        </a:xfrm>
+      </p:grpSpPr>
+      <p:sp>
+        <p:nvSpPr>
+          <p:cNvPr id="2" name="TextBox 1"/>
+          <p:cNvSpPr txBox="1"/>
+          <p:nvPr/>
+        </p:nvSpPr>
+        <p:spPr>
+          <a:xfrm>
+            <a:off x="838200" y="457200"/>
+            <a:ext cx="7239000" cy="523220"/>
+          </a:xfrm>
+          <a:prstGeom prst="rect">
+            <a:avLst/>
+          </a:prstGeom>
+          <a:noFill/>
+        </p:spPr>
+        <p:txBody>
+          <a:bodyPr wrap="square" rtlCol="0">
+            <a:spAutoFit/>
+          </a:bodyPr>
+          <a:lstStyle/>
+          <a:p>
+            <a:r>
+              <a:rPr lang="en-US" sz="2800" dirty="0" smtClean="0"/>
+              <a:t>GitHub: </a:t>
+            </a:r>
+            <a:r>
+              <a:rPr lang="en-US" sz="2800" dirty="0" smtClean="0"/>
+              <a:t>Questions</a:t>
+            </a:r>
+            <a:endParaRPr lang="en-US" sz="2800" dirty="0"/>
+          </a:p>
+        </p:txBody>
+      </p:sp>
+      <p:cxnSp>
+        <p:nvCxnSpPr>
+          <p:cNvPr id="4" name="Straight Connector 3"/>
+          <p:cNvCxnSpPr/>
+          <p:nvPr/>
+        </p:nvCxnSpPr>
+        <p:spPr>
+          <a:xfrm>
+            <a:off x="990600" y="980420"/>
+            <a:ext cx="7162800" cy="0"/>
+          </a:xfrm>
+          <a:prstGeom prst="line">
+            <a:avLst/>
+          </a:prstGeom>
+          <a:ln>
+            <a:solidFill>
+              <a:schemeClr val="accent5"/>
+            </a:solidFill>
+          </a:ln>
+        </p:spPr>
+        <p:style>
+          <a:lnRef idx="1">
+            <a:schemeClr val="accent1"/>
+          </a:lnRef>
+          <a:fillRef idx="0">
+            <a:schemeClr val="accent1"/>
+          </a:fillRef>
+          <a:effectRef idx="0">
+            <a:schemeClr val="accent1"/>
+          </a:effectRef>
+          <a:fontRef idx="minor">
+            <a:schemeClr val="tx1"/>
+          </a:fontRef>
+        </p:style>
+      </p:cxnSp>
+      <p:sp>
+        <p:nvSpPr>
+          <p:cNvPr id="5" name="TextBox 4"/>
+          <p:cNvSpPr txBox="1"/>
+          <p:nvPr/>
+        </p:nvSpPr>
+        <p:spPr>
+          <a:xfrm>
+            <a:off x="990600" y="2667000"/>
+            <a:ext cx="7162800" cy="923330"/>
+          </a:xfrm>
+          <a:prstGeom prst="rect">
+            <a:avLst/>
+          </a:prstGeom>
+          <a:noFill/>
+        </p:spPr>
+        <p:txBody>
+          <a:bodyPr wrap="square" rtlCol="0">
+            <a:spAutoFit/>
+          </a:bodyPr>
+          <a:lstStyle/>
+          <a:p>
+            <a:endParaRPr lang="en-US" dirty="0" smtClean="0"/>
+          </a:p>
+          <a:p>
+            <a:endParaRPr lang="en-US" dirty="0"/>
+          </a:p>
+          <a:p>
+            <a:pPr marL="285750" indent="-285750">
+              <a:buFont typeface="Arial" panose="020B0604020202020204" pitchFamily="34" charset="0"/>
+              <a:buChar char="•"/>
+            </a:pPr>
+            <a:endParaRPr lang="en-US" dirty="0"/>
+          </a:p>
+        </p:txBody>
+      </p:sp>
+    </p:spTree>
+    <p:extLst>
+      <p:ext uri="{BB962C8B-B14F-4D97-AF65-F5344CB8AC3E}">
+        <p14:creationId xmlns:p14="http://schemas.microsoft.com/office/powerpoint/2010/main" val="1470269971"/>
+      </p:ext>
+    </p:extLst>
+  </p:cSld>
+  <p:clrMapOvr>
+    <a:masterClrMapping/>
+  </p:clrMapOvr>
+  <mc:AlternateContent xmlns:mc="http://schemas.openxmlformats.org/markup-compatibility/2006" xmlns:p14="http://schemas.microsoft.com/office/powerpoint/2010/main">
+    <mc:Choice Requires="p14">
+      <p:transition spd="slow" p14:dur="1300">
+        <p14:pan dir="u"/>
+      </p:transition>
+    </mc:Choice>
+    <mc:Fallback xmlns="">
+      <p:transition spd="slow">
+        <p:fade/>
+      </p:transition>
+    </mc:Fallback>
+  </mc:AlternateContent>
+  <p:timing>
+    <p:tnLst>
+      <p:par>
+        <p:cTn id="1" dur="indefinite" restart="never" nodeType="tmRoot"/>
+      </p:par>
+    </p:tnLst>
+  </p:timing>
+</p:sld>
+</file>
+
+<file path=ppt/slides/slide22.xml><?xml version="1.0" encoding="utf-8"?>
+<p:sld xmlns:a="http://schemas.openxmlformats.org/drawingml/2006/main" xmlns:r="http://schemas.openxmlformats.org/officeDocument/2006/relationships" xmlns:p="http://schemas.openxmlformats.org/presentationml/2006/main">
+  <p:cSld>
+    <p:spTree>
+      <p:nvGrpSpPr>
+        <p:cNvPr id="1" name=""/>
+        <p:cNvGrpSpPr/>
+        <p:nvPr/>
+      </p:nvGrpSpPr>
+      <p:grpSpPr>
+        <a:xfrm>
+          <a:off x="0" y="0"/>
+          <a:ext cx="0" cy="0"/>
+          <a:chOff x="0" y="0"/>
+          <a:chExt cx="0" cy="0"/>
+        </a:xfrm>
+      </p:grpSpPr>
+      <p:sp>
+        <p:nvSpPr>
+          <p:cNvPr id="2" name="TextBox 1"/>
+          <p:cNvSpPr txBox="1"/>
+          <p:nvPr/>
+        </p:nvSpPr>
+        <p:spPr>
+          <a:xfrm>
+            <a:off x="838200" y="457200"/>
+            <a:ext cx="7239000" cy="523220"/>
+          </a:xfrm>
+          <a:prstGeom prst="rect">
+            <a:avLst/>
+          </a:prstGeom>
+          <a:noFill/>
+        </p:spPr>
+        <p:txBody>
+          <a:bodyPr wrap="square" rtlCol="0">
+            <a:spAutoFit/>
+          </a:bodyPr>
+          <a:lstStyle/>
+          <a:p>
+            <a:r>
+              <a:rPr lang="en-US" sz="2800" dirty="0" smtClean="0"/>
+              <a:t>GitHub Webinar: Contact Info</a:t>
+            </a:r>
+            <a:endParaRPr lang="en-US" sz="2800" dirty="0"/>
+          </a:p>
+        </p:txBody>
+      </p:sp>
+      <p:cxnSp>
+        <p:nvCxnSpPr>
+          <p:cNvPr id="4" name="Straight Connector 3"/>
+          <p:cNvCxnSpPr/>
+          <p:nvPr/>
+        </p:nvCxnSpPr>
+        <p:spPr>
+          <a:xfrm>
+            <a:off x="990600" y="980420"/>
+            <a:ext cx="7162800" cy="0"/>
+          </a:xfrm>
+          <a:prstGeom prst="line">
+            <a:avLst/>
+          </a:prstGeom>
+          <a:ln>
+            <a:solidFill>
+              <a:schemeClr val="accent5"/>
+            </a:solidFill>
+          </a:ln>
+        </p:spPr>
+        <p:style>
+          <a:lnRef idx="1">
+            <a:schemeClr val="accent1"/>
+          </a:lnRef>
+          <a:fillRef idx="0">
+            <a:schemeClr val="accent1"/>
+          </a:fillRef>
+          <a:effectRef idx="0">
+            <a:schemeClr val="accent1"/>
+          </a:effectRef>
+          <a:fontRef idx="minor">
+            <a:schemeClr val="tx1"/>
+          </a:fontRef>
+        </p:style>
+      </p:cxnSp>
+      <p:sp>
+        <p:nvSpPr>
+          <p:cNvPr id="5" name="TextBox 4"/>
+          <p:cNvSpPr txBox="1"/>
+          <p:nvPr/>
+        </p:nvSpPr>
+        <p:spPr>
+          <a:xfrm>
+            <a:off x="990600" y="1143000"/>
+            <a:ext cx="7162800" cy="3970318"/>
+          </a:xfrm>
+          <a:prstGeom prst="rect">
+            <a:avLst/>
+          </a:prstGeom>
+          <a:noFill/>
+        </p:spPr>
+        <p:txBody>
+          <a:bodyPr wrap="square" rtlCol="0">
+            <a:spAutoFit/>
+          </a:bodyPr>
+          <a:lstStyle/>
+          <a:p>
+            <a:r>
+              <a:rPr lang="en-US" dirty="0" smtClean="0"/>
+              <a:t>MAGIC Questions:</a:t>
+            </a:r>
+          </a:p>
+          <a:p>
+            <a:r>
+              <a:rPr lang="en-US" dirty="0"/>
+              <a:t>	</a:t>
+            </a:r>
+            <a:r>
+              <a:rPr lang="en-US" dirty="0" smtClean="0"/>
+              <a:t>Bob </a:t>
+            </a:r>
+            <a:r>
+              <a:rPr lang="en-US" dirty="0" err="1" smtClean="0"/>
+              <a:t>Nutsch</a:t>
+            </a:r>
+            <a:r>
+              <a:rPr lang="en-US" dirty="0"/>
+              <a:t>: </a:t>
+            </a:r>
+            <a:r>
+              <a:rPr lang="en-US" dirty="0" smtClean="0"/>
+              <a:t>bnutsch@nd.gov</a:t>
+            </a:r>
+          </a:p>
+          <a:p>
+            <a:endParaRPr lang="en-US" dirty="0"/>
+          </a:p>
+          <a:p>
+            <a:r>
+              <a:rPr lang="en-US" dirty="0" smtClean="0"/>
+              <a:t>GitHub Questions:</a:t>
+            </a:r>
+          </a:p>
+          <a:p>
+            <a:r>
+              <a:rPr lang="en-US" dirty="0"/>
+              <a:t>	</a:t>
+            </a:r>
+            <a:r>
+              <a:rPr lang="en-US" dirty="0" smtClean="0"/>
+              <a:t>Tony Davis</a:t>
+            </a:r>
+            <a:r>
+              <a:rPr lang="en-US" dirty="0"/>
+              <a:t>: Tony.Davis@agfc.ar.gov</a:t>
+            </a:r>
+            <a:endParaRPr lang="en-US" dirty="0" smtClean="0"/>
+          </a:p>
+          <a:p>
+            <a:r>
+              <a:rPr lang="en-US" dirty="0"/>
+              <a:t>	</a:t>
+            </a:r>
+            <a:r>
+              <a:rPr lang="en-US" dirty="0" smtClean="0"/>
+              <a:t>Kristen Jordan-Koenig: kristen@kgs.ku.edu</a:t>
+            </a:r>
+          </a:p>
+          <a:p>
+            <a:endParaRPr lang="en-US" dirty="0"/>
+          </a:p>
+          <a:p>
+            <a:r>
+              <a:rPr lang="en-US" dirty="0" smtClean="0"/>
+              <a:t>Video Recording:</a:t>
+            </a:r>
+          </a:p>
+          <a:p>
+            <a:r>
+              <a:rPr lang="en-US" dirty="0"/>
+              <a:t>	</a:t>
+            </a:r>
+            <a:r>
+              <a:rPr lang="en-US" dirty="0" smtClean="0"/>
+              <a:t>Will be posted on YouTube as MAGIC GitHub Webinar 2015</a:t>
+            </a:r>
+          </a:p>
+          <a:p>
+            <a:r>
+              <a:rPr lang="en-US" dirty="0"/>
+              <a:t>	</a:t>
+            </a:r>
+            <a:r>
+              <a:rPr lang="en-US" dirty="0" smtClean="0"/>
+              <a:t>Will link to YouTube from MAGIC website</a:t>
+            </a:r>
+          </a:p>
+          <a:p>
+            <a:endParaRPr lang="en-US" dirty="0"/>
+          </a:p>
+          <a:p>
+            <a:r>
+              <a:rPr lang="en-US" sz="2000" b="1" dirty="0" smtClean="0"/>
+              <a:t>www.magicgis.org</a:t>
+            </a:r>
+            <a:endParaRPr lang="en-US" sz="2000" b="1" dirty="0" smtClean="0"/>
+          </a:p>
+          <a:p>
+            <a:endParaRPr lang="en-US" dirty="0"/>
+          </a:p>
+          <a:p>
+            <a:pPr marL="285750" indent="-285750">
+              <a:buFont typeface="Arial" panose="020B0604020202020204" pitchFamily="34" charset="0"/>
+              <a:buChar char="•"/>
+            </a:pPr>
+            <a:endParaRPr lang="en-US" dirty="0"/>
+          </a:p>
+        </p:txBody>
+      </p:sp>
+      <p:pic>
+        <p:nvPicPr>
+          <p:cNvPr id="6" name="Picture 5"/>
+          <p:cNvPicPr>
+            <a:picLocks noChangeAspect="1"/>
+          </p:cNvPicPr>
+          <p:nvPr/>
+        </p:nvPicPr>
+        <p:blipFill>
+          <a:blip r:embed="rId3" cstate="print">
+            <a:extLst>
+              <a:ext uri="{28A0092B-C50C-407E-A947-70E740481C1C}">
+                <a14:useLocalDpi xmlns:a14="http://schemas.microsoft.com/office/drawing/2010/main" val="0"/>
+              </a:ext>
+            </a:extLst>
+          </a:blip>
+          <a:stretch>
+            <a:fillRect/>
+          </a:stretch>
+        </p:blipFill>
+        <p:spPr>
+          <a:xfrm>
+            <a:off x="6858000" y="4572000"/>
+            <a:ext cx="1989040" cy="1525574"/>
+          </a:xfrm>
+          <a:prstGeom prst="rect">
+            <a:avLst/>
+          </a:prstGeom>
+        </p:spPr>
+      </p:pic>
+    </p:spTree>
+    <p:extLst>
+      <p:ext uri="{BB962C8B-B14F-4D97-AF65-F5344CB8AC3E}">
+        <p14:creationId xmlns:p14="http://schemas.microsoft.com/office/powerpoint/2010/main" val="4196203915"/>
       </p:ext>
     </p:extLst>
   </p:cSld>
@@ -10163,12 +10930,12 @@
               <a:buChar char="•"/>
             </a:pPr>
             <a:r>
-              <a:rPr lang="en-US" dirty="0" err="1" smtClean="0"/>
-              <a:t>Powerpoint</a:t>
-            </a:r>
-            <a:r>
               <a:rPr lang="en-US" dirty="0" smtClean="0"/>
-              <a:t> slides (like this)</a:t>
+              <a:t>PowerPoint </a:t>
+            </a:r>
+            <a:r>
+              <a:rPr lang="en-US" dirty="0" smtClean="0"/>
+              <a:t>slides (like this)</a:t>
             </a:r>
           </a:p>
           <a:p>
@@ -10195,13 +10962,8 @@
           <a:p>
             <a:r>
               <a:rPr lang="en-US" dirty="0" smtClean="0"/>
-              <a:t>Awesome for backups and seeing when </a:t>
-            </a:r>
-            <a:r>
-              <a:rPr lang="en-US" smtClean="0"/>
-              <a:t>changes happened</a:t>
-            </a:r>
-            <a:endParaRPr lang="en-US" dirty="0" smtClean="0"/>
+              <a:t>Awesome for backups and seeing when changes happened</a:t>
+            </a:r>
           </a:p>
           <a:p>
             <a:pPr marL="742950" lvl="1" indent="-285750">
@@ -11038,7 +11800,7 @@
 </file>
 
 <file path=customXml/itemProps1.xml><?xml version="1.0" encoding="utf-8"?>
-<ds:datastoreItem xmlns:ds="http://schemas.openxmlformats.org/officeDocument/2006/customXml" ds:itemID="{E296F241-CF59-4FDC-858A-665AB9D0932B}">
+<ds:datastoreItem xmlns:ds="http://schemas.openxmlformats.org/officeDocument/2006/customXml" ds:itemID="{769E63BE-C297-4D58-9F77-01F72B8CE361}">
   <ds:schemaRefs>
     <ds:schemaRef ds:uri="ESRI.ArcGIS.Mapping.OfficeIntegration.PowerPointInfo"/>
   </ds:schemaRefs>
@@ -11054,7 +11816,7 @@
 </file>
 
 <file path=customXml/itemProps3.xml><?xml version="1.0" encoding="utf-8"?>
-<ds:datastoreItem xmlns:ds="http://schemas.openxmlformats.org/officeDocument/2006/customXml" ds:itemID="{769E63BE-C297-4D58-9F77-01F72B8CE361}">
+<ds:datastoreItem xmlns:ds="http://schemas.openxmlformats.org/officeDocument/2006/customXml" ds:itemID="{E296F241-CF59-4FDC-858A-665AB9D0932B}">
   <ds:schemaRefs>
     <ds:schemaRef ds:uri="ESRI.ArcGIS.Mapping.OfficeIntegration.PowerPointInfo"/>
   </ds:schemaRefs>
@@ -11062,7 +11824,7 @@
 </file>
 
 <file path=customXml/itemProps4.xml><?xml version="1.0" encoding="utf-8"?>
-<ds:datastoreItem xmlns:ds="http://schemas.openxmlformats.org/officeDocument/2006/customXml" ds:itemID="{9037BA00-B0B9-46ED-B894-E24F6F8C453A}">
+<ds:datastoreItem xmlns:ds="http://schemas.openxmlformats.org/officeDocument/2006/customXml" ds:itemID="{D6EC4E9B-D6D6-407A-B8A5-C05B0CAD18B1}">
   <ds:schemaRefs>
     <ds:schemaRef ds:uri="ESRI.ArcGIS.Mapping.OfficeIntegration.PowerPointInfo"/>
   </ds:schemaRefs>

</xml_diff>